<commit_message>
added mschart plot output - need ggplot here
</commit_message>
<xml_diff>
--- a/Output/expamle.pptx
+++ b/Output/expamle.pptx
@@ -8,6 +8,7 @@
     <p:sldId id="256" r:id="rId8"/>
     <p:sldId id="257" r:id="rId9"/>
     <p:sldId id="258" r:id="rId10"/>
+    <p:sldId id="259" r:id="rId11"/>
   </p:sldIdLst>
   <p:sldSz cx="9144000" cy="6858000" type="screen4x3"/>
   <p:notesSz cx="6858000" cy="9144000"/>
@@ -112,7 +113,7 @@
 </p:presentation>
 </file>
 
-<file path=ppt/charts/chart15dc5d76c3b3.xml><?xml version="1.0" encoding="utf-8"?>
+<file path=ppt/charts/chart6c1555b27a1a.xml><?xml version="1.0" encoding="utf-8"?>
 <c:chartSpace xmlns:c="http://schemas.openxmlformats.org/drawingml/2006/chart" xmlns:a="http://schemas.openxmlformats.org/drawingml/2006/main" xmlns:r="http://schemas.openxmlformats.org/officeDocument/2006/relationships">
   <c:date1904 val="0"/>
   <c:lang val="fr-FR"/>
@@ -2952,6 +2953,4334 @@
           <a:chExt cx="0" cy="0"/>
         </a:xfrm>
       </p:grpSpPr>
+      <p:grpSp xmlns:a="http://schemas.openxmlformats.org/drawingml/2006/main" xmlns:r="http://schemas.openxmlformats.org/officeDocument/2006/relationships" xmlns:p="http://schemas.openxmlformats.org/presentationml/2006/main" xmlns:pic="http://schemas.openxmlformats.org/drawingml/2006/picture">
+        <p:nvGrpSpPr>
+          <p:cNvPr name="grp2" id="2"/>
+          <p:cNvGrpSpPr/>
+          <p:nvPr/>
+        </p:nvGrpSpPr>
+        <p:grpSpPr>
+          <a:xfrm>
+            <a:off x="457200" y="1600200"/>
+            <a:ext cx="8229600" cy="4525962"/>
+            <a:chOff x="457200" y="1600200"/>
+            <a:chExt cx="8229600" cy="4525962"/>
+          </a:xfrm>
+        </p:grpSpPr>
+        <p:sp>
+          <p:nvSpPr>
+            <p:cNvPr id="3" name="rc3"/>
+            <p:cNvSpPr/>
+            <p:nvPr/>
+          </p:nvSpPr>
+          <p:spPr>
+            <a:xfrm>
+              <a:off x="457200" y="1600200"/>
+              <a:ext cx="8229600" cy="4525962"/>
+            </a:xfrm>
+            <a:prstGeom prst="rect">
+              <a:avLst/>
+            </a:prstGeom>
+            <a:solidFill>
+              <a:srgbClr val="FFFFFF">
+                <a:alpha val="100000"/>
+              </a:srgbClr>
+            </a:solidFill>
+            <a:ln w="9525" cap="rnd">
+              <a:solidFill>
+                <a:srgbClr val="FFFFFF">
+                  <a:alpha val="100000"/>
+                </a:srgbClr>
+              </a:solidFill>
+              <a:prstDash val="solid"/>
+              <a:round/>
+            </a:ln>
+          </p:spPr>
+          <p:txBody>
+            <a:bodyPr/>
+            <a:lstStyle/>
+            <a:p/>
+          </p:txBody>
+        </p:sp>
+        <p:sp>
+          <p:nvSpPr>
+            <p:cNvPr id="4" name="pt4"/>
+            <p:cNvSpPr/>
+            <p:nvPr/>
+          </p:nvSpPr>
+          <p:spPr>
+            <a:xfrm>
+              <a:off x="1435523" y="3299494"/>
+              <a:ext cx="68580" cy="68580"/>
+            </a:xfrm>
+            <a:prstGeom prst="ellipse">
+              <a:avLst/>
+            </a:prstGeom>
+            <a:ln w="9525" cap="rnd">
+              <a:solidFill>
+                <a:srgbClr val="000000">
+                  <a:alpha val="100000"/>
+                </a:srgbClr>
+              </a:solidFill>
+              <a:prstDash val="solid"/>
+              <a:round/>
+            </a:ln>
+          </p:spPr>
+          <p:txBody>
+            <a:bodyPr/>
+            <a:lstStyle/>
+            <a:p/>
+          </p:txBody>
+        </p:sp>
+        <p:sp>
+          <p:nvSpPr>
+            <p:cNvPr id="5" name="pt5"/>
+            <p:cNvSpPr/>
+            <p:nvPr/>
+          </p:nvSpPr>
+          <p:spPr>
+            <a:xfrm>
+              <a:off x="1501888" y="4059557"/>
+              <a:ext cx="68580" cy="68580"/>
+            </a:xfrm>
+            <a:prstGeom prst="ellipse">
+              <a:avLst/>
+            </a:prstGeom>
+            <a:ln w="9525" cap="rnd">
+              <a:solidFill>
+                <a:srgbClr val="000000">
+                  <a:alpha val="100000"/>
+                </a:srgbClr>
+              </a:solidFill>
+              <a:prstDash val="solid"/>
+              <a:round/>
+            </a:ln>
+          </p:spPr>
+          <p:txBody>
+            <a:bodyPr/>
+            <a:lstStyle/>
+            <a:p/>
+          </p:txBody>
+        </p:sp>
+        <p:sp>
+          <p:nvSpPr>
+            <p:cNvPr id="6" name="pt6"/>
+            <p:cNvSpPr/>
+            <p:nvPr/>
+          </p:nvSpPr>
+          <p:spPr>
+            <a:xfrm>
+              <a:off x="1568253" y="4440365"/>
+              <a:ext cx="68580" cy="68580"/>
+            </a:xfrm>
+            <a:prstGeom prst="ellipse">
+              <a:avLst/>
+            </a:prstGeom>
+            <a:ln w="9525" cap="rnd">
+              <a:solidFill>
+                <a:srgbClr val="000000">
+                  <a:alpha val="100000"/>
+                </a:srgbClr>
+              </a:solidFill>
+              <a:prstDash val="solid"/>
+              <a:round/>
+            </a:ln>
+          </p:spPr>
+          <p:txBody>
+            <a:bodyPr/>
+            <a:lstStyle/>
+            <a:p/>
+          </p:txBody>
+        </p:sp>
+        <p:sp>
+          <p:nvSpPr>
+            <p:cNvPr id="7" name="pt7"/>
+            <p:cNvSpPr/>
+            <p:nvPr/>
+          </p:nvSpPr>
+          <p:spPr>
+            <a:xfrm>
+              <a:off x="1634618" y="3531188"/>
+              <a:ext cx="68580" cy="68580"/>
+            </a:xfrm>
+            <a:prstGeom prst="ellipse">
+              <a:avLst/>
+            </a:prstGeom>
+            <a:ln w="9525" cap="rnd">
+              <a:solidFill>
+                <a:srgbClr val="000000">
+                  <a:alpha val="100000"/>
+                </a:srgbClr>
+              </a:solidFill>
+              <a:prstDash val="solid"/>
+              <a:round/>
+            </a:ln>
+          </p:spPr>
+          <p:txBody>
+            <a:bodyPr/>
+            <a:lstStyle/>
+            <a:p/>
+          </p:txBody>
+        </p:sp>
+        <p:sp>
+          <p:nvSpPr>
+            <p:cNvPr id="8" name="pt8"/>
+            <p:cNvSpPr/>
+            <p:nvPr/>
+          </p:nvSpPr>
+          <p:spPr>
+            <a:xfrm>
+              <a:off x="1700983" y="3276034"/>
+              <a:ext cx="68580" cy="68580"/>
+            </a:xfrm>
+            <a:prstGeom prst="ellipse">
+              <a:avLst/>
+            </a:prstGeom>
+            <a:ln w="9525" cap="rnd">
+              <a:solidFill>
+                <a:srgbClr val="000000">
+                  <a:alpha val="100000"/>
+                </a:srgbClr>
+              </a:solidFill>
+              <a:prstDash val="solid"/>
+              <a:round/>
+            </a:ln>
+          </p:spPr>
+          <p:txBody>
+            <a:bodyPr/>
+            <a:lstStyle/>
+            <a:p/>
+          </p:txBody>
+        </p:sp>
+        <p:sp>
+          <p:nvSpPr>
+            <p:cNvPr id="9" name="pt9"/>
+            <p:cNvSpPr/>
+            <p:nvPr/>
+          </p:nvSpPr>
+          <p:spPr>
+            <a:xfrm>
+              <a:off x="1767348" y="3376619"/>
+              <a:ext cx="68580" cy="68580"/>
+            </a:xfrm>
+            <a:prstGeom prst="ellipse">
+              <a:avLst/>
+            </a:prstGeom>
+            <a:ln w="9525" cap="rnd">
+              <a:solidFill>
+                <a:srgbClr val="000000">
+                  <a:alpha val="100000"/>
+                </a:srgbClr>
+              </a:solidFill>
+              <a:prstDash val="solid"/>
+              <a:round/>
+            </a:ln>
+          </p:spPr>
+          <p:txBody>
+            <a:bodyPr/>
+            <a:lstStyle/>
+            <a:p/>
+          </p:txBody>
+        </p:sp>
+        <p:sp>
+          <p:nvSpPr>
+            <p:cNvPr id="10" name="pt10"/>
+            <p:cNvSpPr/>
+            <p:nvPr/>
+          </p:nvSpPr>
+          <p:spPr>
+            <a:xfrm>
+              <a:off x="1833713" y="3558489"/>
+              <a:ext cx="68580" cy="68580"/>
+            </a:xfrm>
+            <a:prstGeom prst="ellipse">
+              <a:avLst/>
+            </a:prstGeom>
+            <a:ln w="9525" cap="rnd">
+              <a:solidFill>
+                <a:srgbClr val="000000">
+                  <a:alpha val="100000"/>
+                </a:srgbClr>
+              </a:solidFill>
+              <a:prstDash val="solid"/>
+              <a:round/>
+            </a:ln>
+          </p:spPr>
+          <p:txBody>
+            <a:bodyPr/>
+            <a:lstStyle/>
+            <a:p/>
+          </p:txBody>
+        </p:sp>
+        <p:sp>
+          <p:nvSpPr>
+            <p:cNvPr id="11" name="pt11"/>
+            <p:cNvSpPr/>
+            <p:nvPr/>
+          </p:nvSpPr>
+          <p:spPr>
+            <a:xfrm>
+              <a:off x="1900078" y="3394032"/>
+              <a:ext cx="68580" cy="68580"/>
+            </a:xfrm>
+            <a:prstGeom prst="ellipse">
+              <a:avLst/>
+            </a:prstGeom>
+            <a:ln w="9525" cap="rnd">
+              <a:solidFill>
+                <a:srgbClr val="000000">
+                  <a:alpha val="100000"/>
+                </a:srgbClr>
+              </a:solidFill>
+              <a:prstDash val="solid"/>
+              <a:round/>
+            </a:ln>
+          </p:spPr>
+          <p:txBody>
+            <a:bodyPr/>
+            <a:lstStyle/>
+            <a:p/>
+          </p:txBody>
+        </p:sp>
+        <p:sp>
+          <p:nvSpPr>
+            <p:cNvPr id="12" name="pt12"/>
+            <p:cNvSpPr/>
+            <p:nvPr/>
+          </p:nvSpPr>
+          <p:spPr>
+            <a:xfrm>
+              <a:off x="1966443" y="3192506"/>
+              <a:ext cx="68580" cy="68580"/>
+            </a:xfrm>
+            <a:prstGeom prst="ellipse">
+              <a:avLst/>
+            </a:prstGeom>
+            <a:ln w="9525" cap="rnd">
+              <a:solidFill>
+                <a:srgbClr val="000000">
+                  <a:alpha val="100000"/>
+                </a:srgbClr>
+              </a:solidFill>
+              <a:prstDash val="solid"/>
+              <a:round/>
+            </a:ln>
+          </p:spPr>
+          <p:txBody>
+            <a:bodyPr/>
+            <a:lstStyle/>
+            <a:p/>
+          </p:txBody>
+        </p:sp>
+        <p:sp>
+          <p:nvSpPr>
+            <p:cNvPr id="13" name="pt13"/>
+            <p:cNvSpPr/>
+            <p:nvPr/>
+          </p:nvSpPr>
+          <p:spPr>
+            <a:xfrm>
+              <a:off x="2032808" y="4059484"/>
+              <a:ext cx="68580" cy="68580"/>
+            </a:xfrm>
+            <a:prstGeom prst="ellipse">
+              <a:avLst/>
+            </a:prstGeom>
+            <a:ln w="9525" cap="rnd">
+              <a:solidFill>
+                <a:srgbClr val="000000">
+                  <a:alpha val="100000"/>
+                </a:srgbClr>
+              </a:solidFill>
+              <a:prstDash val="solid"/>
+              <a:round/>
+            </a:ln>
+          </p:spPr>
+          <p:txBody>
+            <a:bodyPr/>
+            <a:lstStyle/>
+            <a:p/>
+          </p:txBody>
+        </p:sp>
+        <p:sp>
+          <p:nvSpPr>
+            <p:cNvPr id="14" name="pt14"/>
+            <p:cNvSpPr/>
+            <p:nvPr/>
+          </p:nvSpPr>
+          <p:spPr>
+            <a:xfrm>
+              <a:off x="2099173" y="4810247"/>
+              <a:ext cx="68580" cy="68580"/>
+            </a:xfrm>
+            <a:prstGeom prst="ellipse">
+              <a:avLst/>
+            </a:prstGeom>
+            <a:ln w="9525" cap="rnd">
+              <a:solidFill>
+                <a:srgbClr val="000000">
+                  <a:alpha val="100000"/>
+                </a:srgbClr>
+              </a:solidFill>
+              <a:prstDash val="solid"/>
+              <a:round/>
+            </a:ln>
+          </p:spPr>
+          <p:txBody>
+            <a:bodyPr/>
+            <a:lstStyle/>
+            <a:p/>
+          </p:txBody>
+        </p:sp>
+        <p:sp>
+          <p:nvSpPr>
+            <p:cNvPr id="15" name="pt15"/>
+            <p:cNvSpPr/>
+            <p:nvPr/>
+          </p:nvSpPr>
+          <p:spPr>
+            <a:xfrm>
+              <a:off x="2165538" y="3176311"/>
+              <a:ext cx="68580" cy="68580"/>
+            </a:xfrm>
+            <a:prstGeom prst="ellipse">
+              <a:avLst/>
+            </a:prstGeom>
+            <a:ln w="9525" cap="rnd">
+              <a:solidFill>
+                <a:srgbClr val="000000">
+                  <a:alpha val="100000"/>
+                </a:srgbClr>
+              </a:solidFill>
+              <a:prstDash val="solid"/>
+              <a:round/>
+            </a:ln>
+          </p:spPr>
+          <p:txBody>
+            <a:bodyPr/>
+            <a:lstStyle/>
+            <a:p/>
+          </p:txBody>
+        </p:sp>
+        <p:sp>
+          <p:nvSpPr>
+            <p:cNvPr id="16" name="pt16"/>
+            <p:cNvSpPr/>
+            <p:nvPr/>
+          </p:nvSpPr>
+          <p:spPr>
+            <a:xfrm>
+              <a:off x="2231903" y="3268021"/>
+              <a:ext cx="68580" cy="68580"/>
+            </a:xfrm>
+            <a:prstGeom prst="ellipse">
+              <a:avLst/>
+            </a:prstGeom>
+            <a:ln w="9525" cap="rnd">
+              <a:solidFill>
+                <a:srgbClr val="000000">
+                  <a:alpha val="100000"/>
+                </a:srgbClr>
+              </a:solidFill>
+              <a:prstDash val="solid"/>
+              <a:round/>
+            </a:ln>
+          </p:spPr>
+          <p:txBody>
+            <a:bodyPr/>
+            <a:lstStyle/>
+            <a:p/>
+          </p:txBody>
+        </p:sp>
+        <p:sp>
+          <p:nvSpPr>
+            <p:cNvPr id="17" name="pt17"/>
+            <p:cNvSpPr/>
+            <p:nvPr/>
+          </p:nvSpPr>
+          <p:spPr>
+            <a:xfrm>
+              <a:off x="2298268" y="3172823"/>
+              <a:ext cx="68580" cy="68580"/>
+            </a:xfrm>
+            <a:prstGeom prst="ellipse">
+              <a:avLst/>
+            </a:prstGeom>
+            <a:ln w="9525" cap="rnd">
+              <a:solidFill>
+                <a:srgbClr val="000000">
+                  <a:alpha val="100000"/>
+                </a:srgbClr>
+              </a:solidFill>
+              <a:prstDash val="solid"/>
+              <a:round/>
+            </a:ln>
+          </p:spPr>
+          <p:txBody>
+            <a:bodyPr/>
+            <a:lstStyle/>
+            <a:p/>
+          </p:txBody>
+        </p:sp>
+        <p:sp>
+          <p:nvSpPr>
+            <p:cNvPr id="18" name="pt18"/>
+            <p:cNvSpPr/>
+            <p:nvPr/>
+          </p:nvSpPr>
+          <p:spPr>
+            <a:xfrm>
+              <a:off x="2364633" y="4169712"/>
+              <a:ext cx="68580" cy="68580"/>
+            </a:xfrm>
+            <a:prstGeom prst="ellipse">
+              <a:avLst/>
+            </a:prstGeom>
+            <a:ln w="9525" cap="rnd">
+              <a:solidFill>
+                <a:srgbClr val="000000">
+                  <a:alpha val="100000"/>
+                </a:srgbClr>
+              </a:solidFill>
+              <a:prstDash val="solid"/>
+              <a:round/>
+            </a:ln>
+          </p:spPr>
+          <p:txBody>
+            <a:bodyPr/>
+            <a:lstStyle/>
+            <a:p/>
+          </p:txBody>
+        </p:sp>
+        <p:sp>
+          <p:nvSpPr>
+            <p:cNvPr id="19" name="pt19"/>
+            <p:cNvSpPr/>
+            <p:nvPr/>
+          </p:nvSpPr>
+          <p:spPr>
+            <a:xfrm>
+              <a:off x="2430998" y="3946041"/>
+              <a:ext cx="68580" cy="68580"/>
+            </a:xfrm>
+            <a:prstGeom prst="ellipse">
+              <a:avLst/>
+            </a:prstGeom>
+            <a:ln w="9525" cap="rnd">
+              <a:solidFill>
+                <a:srgbClr val="000000">
+                  <a:alpha val="100000"/>
+                </a:srgbClr>
+              </a:solidFill>
+              <a:prstDash val="solid"/>
+              <a:round/>
+            </a:ln>
+          </p:spPr>
+          <p:txBody>
+            <a:bodyPr/>
+            <a:lstStyle/>
+            <a:p/>
+          </p:txBody>
+        </p:sp>
+        <p:sp>
+          <p:nvSpPr>
+            <p:cNvPr id="20" name="pt20"/>
+            <p:cNvSpPr/>
+            <p:nvPr/>
+          </p:nvSpPr>
+          <p:spPr>
+            <a:xfrm>
+              <a:off x="2497363" y="3765423"/>
+              <a:ext cx="68580" cy="68580"/>
+            </a:xfrm>
+            <a:prstGeom prst="ellipse">
+              <a:avLst/>
+            </a:prstGeom>
+            <a:ln w="9525" cap="rnd">
+              <a:solidFill>
+                <a:srgbClr val="000000">
+                  <a:alpha val="100000"/>
+                </a:srgbClr>
+              </a:solidFill>
+              <a:prstDash val="solid"/>
+              <a:round/>
+            </a:ln>
+          </p:spPr>
+          <p:txBody>
+            <a:bodyPr/>
+            <a:lstStyle/>
+            <a:p/>
+          </p:txBody>
+        </p:sp>
+        <p:sp>
+          <p:nvSpPr>
+            <p:cNvPr id="21" name="pt21"/>
+            <p:cNvSpPr/>
+            <p:nvPr/>
+          </p:nvSpPr>
+          <p:spPr>
+            <a:xfrm>
+              <a:off x="2563728" y="4177862"/>
+              <a:ext cx="68580" cy="68580"/>
+            </a:xfrm>
+            <a:prstGeom prst="ellipse">
+              <a:avLst/>
+            </a:prstGeom>
+            <a:ln w="9525" cap="rnd">
+              <a:solidFill>
+                <a:srgbClr val="000000">
+                  <a:alpha val="100000"/>
+                </a:srgbClr>
+              </a:solidFill>
+              <a:prstDash val="solid"/>
+              <a:round/>
+            </a:ln>
+          </p:spPr>
+          <p:txBody>
+            <a:bodyPr/>
+            <a:lstStyle/>
+            <a:p/>
+          </p:txBody>
+        </p:sp>
+        <p:sp>
+          <p:nvSpPr>
+            <p:cNvPr id="22" name="pt22"/>
+            <p:cNvSpPr/>
+            <p:nvPr/>
+          </p:nvSpPr>
+          <p:spPr>
+            <a:xfrm>
+              <a:off x="2630093" y="3951055"/>
+              <a:ext cx="68580" cy="68580"/>
+            </a:xfrm>
+            <a:prstGeom prst="ellipse">
+              <a:avLst/>
+            </a:prstGeom>
+            <a:ln w="9525" cap="rnd">
+              <a:solidFill>
+                <a:srgbClr val="000000">
+                  <a:alpha val="100000"/>
+                </a:srgbClr>
+              </a:solidFill>
+              <a:prstDash val="solid"/>
+              <a:round/>
+            </a:ln>
+          </p:spPr>
+          <p:txBody>
+            <a:bodyPr/>
+            <a:lstStyle/>
+            <a:p/>
+          </p:txBody>
+        </p:sp>
+        <p:sp>
+          <p:nvSpPr>
+            <p:cNvPr id="23" name="pt23"/>
+            <p:cNvSpPr/>
+            <p:nvPr/>
+          </p:nvSpPr>
+          <p:spPr>
+            <a:xfrm>
+              <a:off x="2696458" y="3806445"/>
+              <a:ext cx="68580" cy="68580"/>
+            </a:xfrm>
+            <a:prstGeom prst="ellipse">
+              <a:avLst/>
+            </a:prstGeom>
+            <a:ln w="9525" cap="rnd">
+              <a:solidFill>
+                <a:srgbClr val="000000">
+                  <a:alpha val="100000"/>
+                </a:srgbClr>
+              </a:solidFill>
+              <a:prstDash val="solid"/>
+              <a:round/>
+            </a:ln>
+          </p:spPr>
+          <p:txBody>
+            <a:bodyPr/>
+            <a:lstStyle/>
+            <a:p/>
+          </p:txBody>
+        </p:sp>
+        <p:sp>
+          <p:nvSpPr>
+            <p:cNvPr id="24" name="pt24"/>
+            <p:cNvSpPr/>
+            <p:nvPr/>
+          </p:nvSpPr>
+          <p:spPr>
+            <a:xfrm>
+              <a:off x="2762822" y="3009957"/>
+              <a:ext cx="68580" cy="68580"/>
+            </a:xfrm>
+            <a:prstGeom prst="ellipse">
+              <a:avLst/>
+            </a:prstGeom>
+            <a:ln w="9525" cap="rnd">
+              <a:solidFill>
+                <a:srgbClr val="000000">
+                  <a:alpha val="100000"/>
+                </a:srgbClr>
+              </a:solidFill>
+              <a:prstDash val="solid"/>
+              <a:round/>
+            </a:ln>
+          </p:spPr>
+          <p:txBody>
+            <a:bodyPr/>
+            <a:lstStyle/>
+            <a:p/>
+          </p:txBody>
+        </p:sp>
+        <p:sp>
+          <p:nvSpPr>
+            <p:cNvPr id="25" name="pt25"/>
+            <p:cNvSpPr/>
+            <p:nvPr/>
+          </p:nvSpPr>
+          <p:spPr>
+            <a:xfrm>
+              <a:off x="2829187" y="5053871"/>
+              <a:ext cx="68580" cy="68580"/>
+            </a:xfrm>
+            <a:prstGeom prst="ellipse">
+              <a:avLst/>
+            </a:prstGeom>
+            <a:ln w="9525" cap="rnd">
+              <a:solidFill>
+                <a:srgbClr val="000000">
+                  <a:alpha val="100000"/>
+                </a:srgbClr>
+              </a:solidFill>
+              <a:prstDash val="solid"/>
+              <a:round/>
+            </a:ln>
+          </p:spPr>
+          <p:txBody>
+            <a:bodyPr/>
+            <a:lstStyle/>
+            <a:p/>
+          </p:txBody>
+        </p:sp>
+        <p:sp>
+          <p:nvSpPr>
+            <p:cNvPr id="26" name="pt26"/>
+            <p:cNvSpPr/>
+            <p:nvPr/>
+          </p:nvSpPr>
+          <p:spPr>
+            <a:xfrm>
+              <a:off x="2895552" y="2714810"/>
+              <a:ext cx="68580" cy="68580"/>
+            </a:xfrm>
+            <a:prstGeom prst="ellipse">
+              <a:avLst/>
+            </a:prstGeom>
+            <a:ln w="9525" cap="rnd">
+              <a:solidFill>
+                <a:srgbClr val="000000">
+                  <a:alpha val="100000"/>
+                </a:srgbClr>
+              </a:solidFill>
+              <a:prstDash val="solid"/>
+              <a:round/>
+            </a:ln>
+          </p:spPr>
+          <p:txBody>
+            <a:bodyPr/>
+            <a:lstStyle/>
+            <a:p/>
+          </p:txBody>
+        </p:sp>
+        <p:sp>
+          <p:nvSpPr>
+            <p:cNvPr id="27" name="pt27"/>
+            <p:cNvSpPr/>
+            <p:nvPr/>
+          </p:nvSpPr>
+          <p:spPr>
+            <a:xfrm>
+              <a:off x="2961917" y="3155064"/>
+              <a:ext cx="68580" cy="68580"/>
+            </a:xfrm>
+            <a:prstGeom prst="ellipse">
+              <a:avLst/>
+            </a:prstGeom>
+            <a:ln w="9525" cap="rnd">
+              <a:solidFill>
+                <a:srgbClr val="000000">
+                  <a:alpha val="100000"/>
+                </a:srgbClr>
+              </a:solidFill>
+              <a:prstDash val="solid"/>
+              <a:round/>
+            </a:ln>
+          </p:spPr>
+          <p:txBody>
+            <a:bodyPr/>
+            <a:lstStyle/>
+            <a:p/>
+          </p:txBody>
+        </p:sp>
+        <p:sp>
+          <p:nvSpPr>
+            <p:cNvPr id="28" name="pt28"/>
+            <p:cNvSpPr/>
+            <p:nvPr/>
+          </p:nvSpPr>
+          <p:spPr>
+            <a:xfrm>
+              <a:off x="3028282" y="4556047"/>
+              <a:ext cx="68580" cy="68580"/>
+            </a:xfrm>
+            <a:prstGeom prst="ellipse">
+              <a:avLst/>
+            </a:prstGeom>
+            <a:ln w="9525" cap="rnd">
+              <a:solidFill>
+                <a:srgbClr val="000000">
+                  <a:alpha val="100000"/>
+                </a:srgbClr>
+              </a:solidFill>
+              <a:prstDash val="solid"/>
+              <a:round/>
+            </a:ln>
+          </p:spPr>
+          <p:txBody>
+            <a:bodyPr/>
+            <a:lstStyle/>
+            <a:p/>
+          </p:txBody>
+        </p:sp>
+        <p:sp>
+          <p:nvSpPr>
+            <p:cNvPr id="29" name="pt29"/>
+            <p:cNvSpPr/>
+            <p:nvPr/>
+          </p:nvSpPr>
+          <p:spPr>
+            <a:xfrm>
+              <a:off x="3094647" y="2613930"/>
+              <a:ext cx="68580" cy="68580"/>
+            </a:xfrm>
+            <a:prstGeom prst="ellipse">
+              <a:avLst/>
+            </a:prstGeom>
+            <a:ln w="9525" cap="rnd">
+              <a:solidFill>
+                <a:srgbClr val="000000">
+                  <a:alpha val="100000"/>
+                </a:srgbClr>
+              </a:solidFill>
+              <a:prstDash val="solid"/>
+              <a:round/>
+            </a:ln>
+          </p:spPr>
+          <p:txBody>
+            <a:bodyPr/>
+            <a:lstStyle/>
+            <a:p/>
+          </p:txBody>
+        </p:sp>
+        <p:sp>
+          <p:nvSpPr>
+            <p:cNvPr id="30" name="pt30"/>
+            <p:cNvSpPr/>
+            <p:nvPr/>
+          </p:nvSpPr>
+          <p:spPr>
+            <a:xfrm>
+              <a:off x="3161012" y="2952663"/>
+              <a:ext cx="68580" cy="68580"/>
+            </a:xfrm>
+            <a:prstGeom prst="ellipse">
+              <a:avLst/>
+            </a:prstGeom>
+            <a:ln w="9525" cap="rnd">
+              <a:solidFill>
+                <a:srgbClr val="000000">
+                  <a:alpha val="100000"/>
+                </a:srgbClr>
+              </a:solidFill>
+              <a:prstDash val="solid"/>
+              <a:round/>
+            </a:ln>
+          </p:spPr>
+          <p:txBody>
+            <a:bodyPr/>
+            <a:lstStyle/>
+            <a:p/>
+          </p:txBody>
+        </p:sp>
+        <p:sp>
+          <p:nvSpPr>
+            <p:cNvPr id="31" name="pt31"/>
+            <p:cNvSpPr/>
+            <p:nvPr/>
+          </p:nvSpPr>
+          <p:spPr>
+            <a:xfrm>
+              <a:off x="3227377" y="3459251"/>
+              <a:ext cx="68580" cy="68580"/>
+            </a:xfrm>
+            <a:prstGeom prst="ellipse">
+              <a:avLst/>
+            </a:prstGeom>
+            <a:ln w="9525" cap="rnd">
+              <a:solidFill>
+                <a:srgbClr val="000000">
+                  <a:alpha val="100000"/>
+                </a:srgbClr>
+              </a:solidFill>
+              <a:prstDash val="solid"/>
+              <a:round/>
+            </a:ln>
+          </p:spPr>
+          <p:txBody>
+            <a:bodyPr/>
+            <a:lstStyle/>
+            <a:p/>
+          </p:txBody>
+        </p:sp>
+        <p:sp>
+          <p:nvSpPr>
+            <p:cNvPr id="32" name="pt32"/>
+            <p:cNvSpPr/>
+            <p:nvPr/>
+          </p:nvSpPr>
+          <p:spPr>
+            <a:xfrm>
+              <a:off x="3293742" y="3445761"/>
+              <a:ext cx="68580" cy="68580"/>
+            </a:xfrm>
+            <a:prstGeom prst="ellipse">
+              <a:avLst/>
+            </a:prstGeom>
+            <a:ln w="9525" cap="rnd">
+              <a:solidFill>
+                <a:srgbClr val="000000">
+                  <a:alpha val="100000"/>
+                </a:srgbClr>
+              </a:solidFill>
+              <a:prstDash val="solid"/>
+              <a:round/>
+            </a:ln>
+          </p:spPr>
+          <p:txBody>
+            <a:bodyPr/>
+            <a:lstStyle/>
+            <a:p/>
+          </p:txBody>
+        </p:sp>
+        <p:sp>
+          <p:nvSpPr>
+            <p:cNvPr id="33" name="pt33"/>
+            <p:cNvSpPr/>
+            <p:nvPr/>
+          </p:nvSpPr>
+          <p:spPr>
+            <a:xfrm>
+              <a:off x="3360107" y="4117572"/>
+              <a:ext cx="68580" cy="68580"/>
+            </a:xfrm>
+            <a:prstGeom prst="ellipse">
+              <a:avLst/>
+            </a:prstGeom>
+            <a:ln w="9525" cap="rnd">
+              <a:solidFill>
+                <a:srgbClr val="000000">
+                  <a:alpha val="100000"/>
+                </a:srgbClr>
+              </a:solidFill>
+              <a:prstDash val="solid"/>
+              <a:round/>
+            </a:ln>
+          </p:spPr>
+          <p:txBody>
+            <a:bodyPr/>
+            <a:lstStyle/>
+            <a:p/>
+          </p:txBody>
+        </p:sp>
+        <p:sp>
+          <p:nvSpPr>
+            <p:cNvPr id="34" name="pt34"/>
+            <p:cNvSpPr/>
+            <p:nvPr/>
+          </p:nvSpPr>
+          <p:spPr>
+            <a:xfrm>
+              <a:off x="3426472" y="3576018"/>
+              <a:ext cx="68580" cy="68580"/>
+            </a:xfrm>
+            <a:prstGeom prst="ellipse">
+              <a:avLst/>
+            </a:prstGeom>
+            <a:ln w="9525" cap="rnd">
+              <a:solidFill>
+                <a:srgbClr val="000000">
+                  <a:alpha val="100000"/>
+                </a:srgbClr>
+              </a:solidFill>
+              <a:prstDash val="solid"/>
+              <a:round/>
+            </a:ln>
+          </p:spPr>
+          <p:txBody>
+            <a:bodyPr/>
+            <a:lstStyle/>
+            <a:p/>
+          </p:txBody>
+        </p:sp>
+        <p:sp>
+          <p:nvSpPr>
+            <p:cNvPr id="35" name="pt35"/>
+            <p:cNvSpPr/>
+            <p:nvPr/>
+          </p:nvSpPr>
+          <p:spPr>
+            <a:xfrm>
+              <a:off x="3492837" y="2570511"/>
+              <a:ext cx="68580" cy="68580"/>
+            </a:xfrm>
+            <a:prstGeom prst="ellipse">
+              <a:avLst/>
+            </a:prstGeom>
+            <a:ln w="9525" cap="rnd">
+              <a:solidFill>
+                <a:srgbClr val="000000">
+                  <a:alpha val="100000"/>
+                </a:srgbClr>
+              </a:solidFill>
+              <a:prstDash val="solid"/>
+              <a:round/>
+            </a:ln>
+          </p:spPr>
+          <p:txBody>
+            <a:bodyPr/>
+            <a:lstStyle/>
+            <a:p/>
+          </p:txBody>
+        </p:sp>
+        <p:sp>
+          <p:nvSpPr>
+            <p:cNvPr id="36" name="pt36"/>
+            <p:cNvSpPr/>
+            <p:nvPr/>
+          </p:nvSpPr>
+          <p:spPr>
+            <a:xfrm>
+              <a:off x="3559202" y="3634094"/>
+              <a:ext cx="68580" cy="68580"/>
+            </a:xfrm>
+            <a:prstGeom prst="ellipse">
+              <a:avLst/>
+            </a:prstGeom>
+            <a:ln w="9525" cap="rnd">
+              <a:solidFill>
+                <a:srgbClr val="000000">
+                  <a:alpha val="100000"/>
+                </a:srgbClr>
+              </a:solidFill>
+              <a:prstDash val="solid"/>
+              <a:round/>
+            </a:ln>
+          </p:spPr>
+          <p:txBody>
+            <a:bodyPr/>
+            <a:lstStyle/>
+            <a:p/>
+          </p:txBody>
+        </p:sp>
+        <p:sp>
+          <p:nvSpPr>
+            <p:cNvPr id="37" name="pt37"/>
+            <p:cNvSpPr/>
+            <p:nvPr/>
+          </p:nvSpPr>
+          <p:spPr>
+            <a:xfrm>
+              <a:off x="3625567" y="3474576"/>
+              <a:ext cx="68580" cy="68580"/>
+            </a:xfrm>
+            <a:prstGeom prst="ellipse">
+              <a:avLst/>
+            </a:prstGeom>
+            <a:ln w="9525" cap="rnd">
+              <a:solidFill>
+                <a:srgbClr val="000000">
+                  <a:alpha val="100000"/>
+                </a:srgbClr>
+              </a:solidFill>
+              <a:prstDash val="solid"/>
+              <a:round/>
+            </a:ln>
+          </p:spPr>
+          <p:txBody>
+            <a:bodyPr/>
+            <a:lstStyle/>
+            <a:p/>
+          </p:txBody>
+        </p:sp>
+        <p:sp>
+          <p:nvSpPr>
+            <p:cNvPr id="38" name="pt38"/>
+            <p:cNvSpPr/>
+            <p:nvPr/>
+          </p:nvSpPr>
+          <p:spPr>
+            <a:xfrm>
+              <a:off x="3691932" y="3658091"/>
+              <a:ext cx="68580" cy="68580"/>
+            </a:xfrm>
+            <a:prstGeom prst="ellipse">
+              <a:avLst/>
+            </a:prstGeom>
+            <a:ln w="9525" cap="rnd">
+              <a:solidFill>
+                <a:srgbClr val="000000">
+                  <a:alpha val="100000"/>
+                </a:srgbClr>
+              </a:solidFill>
+              <a:prstDash val="solid"/>
+              <a:round/>
+            </a:ln>
+          </p:spPr>
+          <p:txBody>
+            <a:bodyPr/>
+            <a:lstStyle/>
+            <a:p/>
+          </p:txBody>
+        </p:sp>
+        <p:sp>
+          <p:nvSpPr>
+            <p:cNvPr id="39" name="pt39"/>
+            <p:cNvSpPr/>
+            <p:nvPr/>
+          </p:nvSpPr>
+          <p:spPr>
+            <a:xfrm>
+              <a:off x="3758297" y="3009694"/>
+              <a:ext cx="68580" cy="68580"/>
+            </a:xfrm>
+            <a:prstGeom prst="ellipse">
+              <a:avLst/>
+            </a:prstGeom>
+            <a:ln w="9525" cap="rnd">
+              <a:solidFill>
+                <a:srgbClr val="000000">
+                  <a:alpha val="100000"/>
+                </a:srgbClr>
+              </a:solidFill>
+              <a:prstDash val="solid"/>
+              <a:round/>
+            </a:ln>
+          </p:spPr>
+          <p:txBody>
+            <a:bodyPr/>
+            <a:lstStyle/>
+            <a:p/>
+          </p:txBody>
+        </p:sp>
+        <p:sp>
+          <p:nvSpPr>
+            <p:cNvPr id="40" name="pt40"/>
+            <p:cNvSpPr/>
+            <p:nvPr/>
+          </p:nvSpPr>
+          <p:spPr>
+            <a:xfrm>
+              <a:off x="3824662" y="2743437"/>
+              <a:ext cx="68580" cy="68580"/>
+            </a:xfrm>
+            <a:prstGeom prst="ellipse">
+              <a:avLst/>
+            </a:prstGeom>
+            <a:ln w="9525" cap="rnd">
+              <a:solidFill>
+                <a:srgbClr val="000000">
+                  <a:alpha val="100000"/>
+                </a:srgbClr>
+              </a:solidFill>
+              <a:prstDash val="solid"/>
+              <a:round/>
+            </a:ln>
+          </p:spPr>
+          <p:txBody>
+            <a:bodyPr/>
+            <a:lstStyle/>
+            <a:p/>
+          </p:txBody>
+        </p:sp>
+        <p:sp>
+          <p:nvSpPr>
+            <p:cNvPr id="41" name="pt41"/>
+            <p:cNvSpPr/>
+            <p:nvPr/>
+          </p:nvSpPr>
+          <p:spPr>
+            <a:xfrm>
+              <a:off x="3891027" y="2870595"/>
+              <a:ext cx="68580" cy="68580"/>
+            </a:xfrm>
+            <a:prstGeom prst="ellipse">
+              <a:avLst/>
+            </a:prstGeom>
+            <a:ln w="9525" cap="rnd">
+              <a:solidFill>
+                <a:srgbClr val="000000">
+                  <a:alpha val="100000"/>
+                </a:srgbClr>
+              </a:solidFill>
+              <a:prstDash val="solid"/>
+              <a:round/>
+            </a:ln>
+          </p:spPr>
+          <p:txBody>
+            <a:bodyPr/>
+            <a:lstStyle/>
+            <a:p/>
+          </p:txBody>
+        </p:sp>
+        <p:sp>
+          <p:nvSpPr>
+            <p:cNvPr id="42" name="pt42"/>
+            <p:cNvSpPr/>
+            <p:nvPr/>
+          </p:nvSpPr>
+          <p:spPr>
+            <a:xfrm>
+              <a:off x="3957392" y="3826408"/>
+              <a:ext cx="68580" cy="68580"/>
+            </a:xfrm>
+            <a:prstGeom prst="ellipse">
+              <a:avLst/>
+            </a:prstGeom>
+            <a:ln w="9525" cap="rnd">
+              <a:solidFill>
+                <a:srgbClr val="000000">
+                  <a:alpha val="100000"/>
+                </a:srgbClr>
+              </a:solidFill>
+              <a:prstDash val="solid"/>
+              <a:round/>
+            </a:ln>
+          </p:spPr>
+          <p:txBody>
+            <a:bodyPr/>
+            <a:lstStyle/>
+            <a:p/>
+          </p:txBody>
+        </p:sp>
+        <p:sp>
+          <p:nvSpPr>
+            <p:cNvPr id="43" name="pt43"/>
+            <p:cNvSpPr/>
+            <p:nvPr/>
+          </p:nvSpPr>
+          <p:spPr>
+            <a:xfrm>
+              <a:off x="4023757" y="3508201"/>
+              <a:ext cx="68580" cy="68580"/>
+            </a:xfrm>
+            <a:prstGeom prst="ellipse">
+              <a:avLst/>
+            </a:prstGeom>
+            <a:ln w="9525" cap="rnd">
+              <a:solidFill>
+                <a:srgbClr val="000000">
+                  <a:alpha val="100000"/>
+                </a:srgbClr>
+              </a:solidFill>
+              <a:prstDash val="solid"/>
+              <a:round/>
+            </a:ln>
+          </p:spPr>
+          <p:txBody>
+            <a:bodyPr/>
+            <a:lstStyle/>
+            <a:p/>
+          </p:txBody>
+        </p:sp>
+        <p:sp>
+          <p:nvSpPr>
+            <p:cNvPr id="44" name="pt44"/>
+            <p:cNvSpPr/>
+            <p:nvPr/>
+          </p:nvSpPr>
+          <p:spPr>
+            <a:xfrm>
+              <a:off x="4090122" y="3106009"/>
+              <a:ext cx="68580" cy="68580"/>
+            </a:xfrm>
+            <a:prstGeom prst="ellipse">
+              <a:avLst/>
+            </a:prstGeom>
+            <a:ln w="9525" cap="rnd">
+              <a:solidFill>
+                <a:srgbClr val="000000">
+                  <a:alpha val="100000"/>
+                </a:srgbClr>
+              </a:solidFill>
+              <a:prstDash val="solid"/>
+              <a:round/>
+            </a:ln>
+          </p:spPr>
+          <p:txBody>
+            <a:bodyPr/>
+            <a:lstStyle/>
+            <a:p/>
+          </p:txBody>
+        </p:sp>
+        <p:sp>
+          <p:nvSpPr>
+            <p:cNvPr id="45" name="pt45"/>
+            <p:cNvSpPr/>
+            <p:nvPr/>
+          </p:nvSpPr>
+          <p:spPr>
+            <a:xfrm>
+              <a:off x="4156487" y="3419087"/>
+              <a:ext cx="68580" cy="68580"/>
+            </a:xfrm>
+            <a:prstGeom prst="ellipse">
+              <a:avLst/>
+            </a:prstGeom>
+            <a:ln w="9525" cap="rnd">
+              <a:solidFill>
+                <a:srgbClr val="000000">
+                  <a:alpha val="100000"/>
+                </a:srgbClr>
+              </a:solidFill>
+              <a:prstDash val="solid"/>
+              <a:round/>
+            </a:ln>
+          </p:spPr>
+          <p:txBody>
+            <a:bodyPr/>
+            <a:lstStyle/>
+            <a:p/>
+          </p:txBody>
+        </p:sp>
+        <p:sp>
+          <p:nvSpPr>
+            <p:cNvPr id="46" name="pt46"/>
+            <p:cNvSpPr/>
+            <p:nvPr/>
+          </p:nvSpPr>
+          <p:spPr>
+            <a:xfrm>
+              <a:off x="4222852" y="4618113"/>
+              <a:ext cx="68580" cy="68580"/>
+            </a:xfrm>
+            <a:prstGeom prst="ellipse">
+              <a:avLst/>
+            </a:prstGeom>
+            <a:ln w="9525" cap="rnd">
+              <a:solidFill>
+                <a:srgbClr val="000000">
+                  <a:alpha val="100000"/>
+                </a:srgbClr>
+              </a:solidFill>
+              <a:prstDash val="solid"/>
+              <a:round/>
+            </a:ln>
+          </p:spPr>
+          <p:txBody>
+            <a:bodyPr/>
+            <a:lstStyle/>
+            <a:p/>
+          </p:txBody>
+        </p:sp>
+        <p:sp>
+          <p:nvSpPr>
+            <p:cNvPr id="47" name="pt47"/>
+            <p:cNvSpPr/>
+            <p:nvPr/>
+          </p:nvSpPr>
+          <p:spPr>
+            <a:xfrm>
+              <a:off x="4289217" y="3081640"/>
+              <a:ext cx="68580" cy="68580"/>
+            </a:xfrm>
+            <a:prstGeom prst="ellipse">
+              <a:avLst/>
+            </a:prstGeom>
+            <a:ln w="9525" cap="rnd">
+              <a:solidFill>
+                <a:srgbClr val="000000">
+                  <a:alpha val="100000"/>
+                </a:srgbClr>
+              </a:solidFill>
+              <a:prstDash val="solid"/>
+              <a:round/>
+            </a:ln>
+          </p:spPr>
+          <p:txBody>
+            <a:bodyPr/>
+            <a:lstStyle/>
+            <a:p/>
+          </p:txBody>
+        </p:sp>
+        <p:sp>
+          <p:nvSpPr>
+            <p:cNvPr id="48" name="pt48"/>
+            <p:cNvSpPr/>
+            <p:nvPr/>
+          </p:nvSpPr>
+          <p:spPr>
+            <a:xfrm>
+              <a:off x="4355582" y="3518977"/>
+              <a:ext cx="68580" cy="68580"/>
+            </a:xfrm>
+            <a:prstGeom prst="ellipse">
+              <a:avLst/>
+            </a:prstGeom>
+            <a:ln w="9525" cap="rnd">
+              <a:solidFill>
+                <a:srgbClr val="000000">
+                  <a:alpha val="100000"/>
+                </a:srgbClr>
+              </a:solidFill>
+              <a:prstDash val="solid"/>
+              <a:round/>
+            </a:ln>
+          </p:spPr>
+          <p:txBody>
+            <a:bodyPr/>
+            <a:lstStyle/>
+            <a:p/>
+          </p:txBody>
+        </p:sp>
+        <p:sp>
+          <p:nvSpPr>
+            <p:cNvPr id="49" name="pt49"/>
+            <p:cNvSpPr/>
+            <p:nvPr/>
+          </p:nvSpPr>
+          <p:spPr>
+            <a:xfrm>
+              <a:off x="4421947" y="3364714"/>
+              <a:ext cx="68580" cy="68580"/>
+            </a:xfrm>
+            <a:prstGeom prst="ellipse">
+              <a:avLst/>
+            </a:prstGeom>
+            <a:ln w="9525" cap="rnd">
+              <a:solidFill>
+                <a:srgbClr val="000000">
+                  <a:alpha val="100000"/>
+                </a:srgbClr>
+              </a:solidFill>
+              <a:prstDash val="solid"/>
+              <a:round/>
+            </a:ln>
+          </p:spPr>
+          <p:txBody>
+            <a:bodyPr/>
+            <a:lstStyle/>
+            <a:p/>
+          </p:txBody>
+        </p:sp>
+        <p:sp>
+          <p:nvSpPr>
+            <p:cNvPr id="50" name="pt50"/>
+            <p:cNvSpPr/>
+            <p:nvPr/>
+          </p:nvSpPr>
+          <p:spPr>
+            <a:xfrm>
+              <a:off x="4488312" y="3253596"/>
+              <a:ext cx="68580" cy="68580"/>
+            </a:xfrm>
+            <a:prstGeom prst="ellipse">
+              <a:avLst/>
+            </a:prstGeom>
+            <a:ln w="9525" cap="rnd">
+              <a:solidFill>
+                <a:srgbClr val="000000">
+                  <a:alpha val="100000"/>
+                </a:srgbClr>
+              </a:solidFill>
+              <a:prstDash val="solid"/>
+              <a:round/>
+            </a:ln>
+          </p:spPr>
+          <p:txBody>
+            <a:bodyPr/>
+            <a:lstStyle/>
+            <a:p/>
+          </p:txBody>
+        </p:sp>
+        <p:sp>
+          <p:nvSpPr>
+            <p:cNvPr id="51" name="pt51"/>
+            <p:cNvSpPr/>
+            <p:nvPr/>
+          </p:nvSpPr>
+          <p:spPr>
+            <a:xfrm>
+              <a:off x="4554677" y="3829941"/>
+              <a:ext cx="68580" cy="68580"/>
+            </a:xfrm>
+            <a:prstGeom prst="ellipse">
+              <a:avLst/>
+            </a:prstGeom>
+            <a:ln w="9525" cap="rnd">
+              <a:solidFill>
+                <a:srgbClr val="000000">
+                  <a:alpha val="100000"/>
+                </a:srgbClr>
+              </a:solidFill>
+              <a:prstDash val="solid"/>
+              <a:round/>
+            </a:ln>
+          </p:spPr>
+          <p:txBody>
+            <a:bodyPr/>
+            <a:lstStyle/>
+            <a:p/>
+          </p:txBody>
+        </p:sp>
+        <p:sp>
+          <p:nvSpPr>
+            <p:cNvPr id="52" name="pt52"/>
+            <p:cNvSpPr/>
+            <p:nvPr/>
+          </p:nvSpPr>
+          <p:spPr>
+            <a:xfrm>
+              <a:off x="4621042" y="3937134"/>
+              <a:ext cx="68580" cy="68580"/>
+            </a:xfrm>
+            <a:prstGeom prst="ellipse">
+              <a:avLst/>
+            </a:prstGeom>
+            <a:ln w="9525" cap="rnd">
+              <a:solidFill>
+                <a:srgbClr val="000000">
+                  <a:alpha val="100000"/>
+                </a:srgbClr>
+              </a:solidFill>
+              <a:prstDash val="solid"/>
+              <a:round/>
+            </a:ln>
+          </p:spPr>
+          <p:txBody>
+            <a:bodyPr/>
+            <a:lstStyle/>
+            <a:p/>
+          </p:txBody>
+        </p:sp>
+        <p:sp>
+          <p:nvSpPr>
+            <p:cNvPr id="53" name="pt53"/>
+            <p:cNvSpPr/>
+            <p:nvPr/>
+          </p:nvSpPr>
+          <p:spPr>
+            <a:xfrm>
+              <a:off x="4687407" y="3344569"/>
+              <a:ext cx="68580" cy="68580"/>
+            </a:xfrm>
+            <a:prstGeom prst="ellipse">
+              <a:avLst/>
+            </a:prstGeom>
+            <a:ln w="9525" cap="rnd">
+              <a:solidFill>
+                <a:srgbClr val="000000">
+                  <a:alpha val="100000"/>
+                </a:srgbClr>
+              </a:solidFill>
+              <a:prstDash val="solid"/>
+              <a:round/>
+            </a:ln>
+          </p:spPr>
+          <p:txBody>
+            <a:bodyPr/>
+            <a:lstStyle/>
+            <a:p/>
+          </p:txBody>
+        </p:sp>
+        <p:sp>
+          <p:nvSpPr>
+            <p:cNvPr id="54" name="pt54"/>
+            <p:cNvSpPr/>
+            <p:nvPr/>
+          </p:nvSpPr>
+          <p:spPr>
+            <a:xfrm>
+              <a:off x="4753772" y="3318506"/>
+              <a:ext cx="68580" cy="68580"/>
+            </a:xfrm>
+            <a:prstGeom prst="ellipse">
+              <a:avLst/>
+            </a:prstGeom>
+            <a:ln w="9525" cap="rnd">
+              <a:solidFill>
+                <a:srgbClr val="000000">
+                  <a:alpha val="100000"/>
+                </a:srgbClr>
+              </a:solidFill>
+              <a:prstDash val="solid"/>
+              <a:round/>
+            </a:ln>
+          </p:spPr>
+          <p:txBody>
+            <a:bodyPr/>
+            <a:lstStyle/>
+            <a:p/>
+          </p:txBody>
+        </p:sp>
+        <p:sp>
+          <p:nvSpPr>
+            <p:cNvPr id="55" name="pt55"/>
+            <p:cNvSpPr/>
+            <p:nvPr/>
+          </p:nvSpPr>
+          <p:spPr>
+            <a:xfrm>
+              <a:off x="4820137" y="3143787"/>
+              <a:ext cx="68580" cy="68580"/>
+            </a:xfrm>
+            <a:prstGeom prst="ellipse">
+              <a:avLst/>
+            </a:prstGeom>
+            <a:ln w="9525" cap="rnd">
+              <a:solidFill>
+                <a:srgbClr val="000000">
+                  <a:alpha val="100000"/>
+                </a:srgbClr>
+              </a:solidFill>
+              <a:prstDash val="solid"/>
+              <a:round/>
+            </a:ln>
+          </p:spPr>
+          <p:txBody>
+            <a:bodyPr/>
+            <a:lstStyle/>
+            <a:p/>
+          </p:txBody>
+        </p:sp>
+        <p:sp>
+          <p:nvSpPr>
+            <p:cNvPr id="56" name="pt56"/>
+            <p:cNvSpPr/>
+            <p:nvPr/>
+          </p:nvSpPr>
+          <p:spPr>
+            <a:xfrm>
+              <a:off x="4886502" y="2863457"/>
+              <a:ext cx="68580" cy="68580"/>
+            </a:xfrm>
+            <a:prstGeom prst="ellipse">
+              <a:avLst/>
+            </a:prstGeom>
+            <a:ln w="9525" cap="rnd">
+              <a:solidFill>
+                <a:srgbClr val="000000">
+                  <a:alpha val="100000"/>
+                </a:srgbClr>
+              </a:solidFill>
+              <a:prstDash val="solid"/>
+              <a:round/>
+            </a:ln>
+          </p:spPr>
+          <p:txBody>
+            <a:bodyPr/>
+            <a:lstStyle/>
+            <a:p/>
+          </p:txBody>
+        </p:sp>
+        <p:sp>
+          <p:nvSpPr>
+            <p:cNvPr id="57" name="pt57"/>
+            <p:cNvSpPr/>
+            <p:nvPr/>
+          </p:nvSpPr>
+          <p:spPr>
+            <a:xfrm>
+              <a:off x="4952867" y="3824001"/>
+              <a:ext cx="68580" cy="68580"/>
+            </a:xfrm>
+            <a:prstGeom prst="ellipse">
+              <a:avLst/>
+            </a:prstGeom>
+            <a:ln w="9525" cap="rnd">
+              <a:solidFill>
+                <a:srgbClr val="000000">
+                  <a:alpha val="100000"/>
+                </a:srgbClr>
+              </a:solidFill>
+              <a:prstDash val="solid"/>
+              <a:round/>
+            </a:ln>
+          </p:spPr>
+          <p:txBody>
+            <a:bodyPr/>
+            <a:lstStyle/>
+            <a:p/>
+          </p:txBody>
+        </p:sp>
+        <p:sp>
+          <p:nvSpPr>
+            <p:cNvPr id="58" name="pt58"/>
+            <p:cNvSpPr/>
+            <p:nvPr/>
+          </p:nvSpPr>
+          <p:spPr>
+            <a:xfrm>
+              <a:off x="5019232" y="3398357"/>
+              <a:ext cx="68580" cy="68580"/>
+            </a:xfrm>
+            <a:prstGeom prst="ellipse">
+              <a:avLst/>
+            </a:prstGeom>
+            <a:ln w="9525" cap="rnd">
+              <a:solidFill>
+                <a:srgbClr val="000000">
+                  <a:alpha val="100000"/>
+                </a:srgbClr>
+              </a:solidFill>
+              <a:prstDash val="solid"/>
+              <a:round/>
+            </a:ln>
+          </p:spPr>
+          <p:txBody>
+            <a:bodyPr/>
+            <a:lstStyle/>
+            <a:p/>
+          </p:txBody>
+        </p:sp>
+        <p:sp>
+          <p:nvSpPr>
+            <p:cNvPr id="59" name="pt59"/>
+            <p:cNvSpPr/>
+            <p:nvPr/>
+          </p:nvSpPr>
+          <p:spPr>
+            <a:xfrm>
+              <a:off x="5085597" y="3521952"/>
+              <a:ext cx="68580" cy="68580"/>
+            </a:xfrm>
+            <a:prstGeom prst="ellipse">
+              <a:avLst/>
+            </a:prstGeom>
+            <a:ln w="9525" cap="rnd">
+              <a:solidFill>
+                <a:srgbClr val="000000">
+                  <a:alpha val="100000"/>
+                </a:srgbClr>
+              </a:solidFill>
+              <a:prstDash val="solid"/>
+              <a:round/>
+            </a:ln>
+          </p:spPr>
+          <p:txBody>
+            <a:bodyPr/>
+            <a:lstStyle/>
+            <a:p/>
+          </p:txBody>
+        </p:sp>
+        <p:sp>
+          <p:nvSpPr>
+            <p:cNvPr id="60" name="pt60"/>
+            <p:cNvSpPr/>
+            <p:nvPr/>
+          </p:nvSpPr>
+          <p:spPr>
+            <a:xfrm>
+              <a:off x="5151962" y="3203976"/>
+              <a:ext cx="68580" cy="68580"/>
+            </a:xfrm>
+            <a:prstGeom prst="ellipse">
+              <a:avLst/>
+            </a:prstGeom>
+            <a:ln w="9525" cap="rnd">
+              <a:solidFill>
+                <a:srgbClr val="000000">
+                  <a:alpha val="100000"/>
+                </a:srgbClr>
+              </a:solidFill>
+              <a:prstDash val="solid"/>
+              <a:round/>
+            </a:ln>
+          </p:spPr>
+          <p:txBody>
+            <a:bodyPr/>
+            <a:lstStyle/>
+            <a:p/>
+          </p:txBody>
+        </p:sp>
+        <p:sp>
+          <p:nvSpPr>
+            <p:cNvPr id="61" name="pt61"/>
+            <p:cNvSpPr/>
+            <p:nvPr/>
+          </p:nvSpPr>
+          <p:spPr>
+            <a:xfrm>
+              <a:off x="5218327" y="4005343"/>
+              <a:ext cx="68580" cy="68580"/>
+            </a:xfrm>
+            <a:prstGeom prst="ellipse">
+              <a:avLst/>
+            </a:prstGeom>
+            <a:ln w="9525" cap="rnd">
+              <a:solidFill>
+                <a:srgbClr val="000000">
+                  <a:alpha val="100000"/>
+                </a:srgbClr>
+              </a:solidFill>
+              <a:prstDash val="solid"/>
+              <a:round/>
+            </a:ln>
+          </p:spPr>
+          <p:txBody>
+            <a:bodyPr/>
+            <a:lstStyle/>
+            <a:p/>
+          </p:txBody>
+        </p:sp>
+        <p:sp>
+          <p:nvSpPr>
+            <p:cNvPr id="62" name="pt62"/>
+            <p:cNvSpPr/>
+            <p:nvPr/>
+          </p:nvSpPr>
+          <p:spPr>
+            <a:xfrm>
+              <a:off x="5284692" y="3849662"/>
+              <a:ext cx="68580" cy="68580"/>
+            </a:xfrm>
+            <a:prstGeom prst="ellipse">
+              <a:avLst/>
+            </a:prstGeom>
+            <a:ln w="9525" cap="rnd">
+              <a:solidFill>
+                <a:srgbClr val="000000">
+                  <a:alpha val="100000"/>
+                </a:srgbClr>
+              </a:solidFill>
+              <a:prstDash val="solid"/>
+              <a:round/>
+            </a:ln>
+          </p:spPr>
+          <p:txBody>
+            <a:bodyPr/>
+            <a:lstStyle/>
+            <a:p/>
+          </p:txBody>
+        </p:sp>
+        <p:sp>
+          <p:nvSpPr>
+            <p:cNvPr id="63" name="pt63"/>
+            <p:cNvSpPr/>
+            <p:nvPr/>
+          </p:nvSpPr>
+          <p:spPr>
+            <a:xfrm>
+              <a:off x="5351057" y="3048917"/>
+              <a:ext cx="68580" cy="68580"/>
+            </a:xfrm>
+            <a:prstGeom prst="ellipse">
+              <a:avLst/>
+            </a:prstGeom>
+            <a:ln w="9525" cap="rnd">
+              <a:solidFill>
+                <a:srgbClr val="000000">
+                  <a:alpha val="100000"/>
+                </a:srgbClr>
+              </a:solidFill>
+              <a:prstDash val="solid"/>
+              <a:round/>
+            </a:ln>
+          </p:spPr>
+          <p:txBody>
+            <a:bodyPr/>
+            <a:lstStyle/>
+            <a:p/>
+          </p:txBody>
+        </p:sp>
+        <p:sp>
+          <p:nvSpPr>
+            <p:cNvPr id="64" name="pt64"/>
+            <p:cNvSpPr/>
+            <p:nvPr/>
+          </p:nvSpPr>
+          <p:spPr>
+            <a:xfrm>
+              <a:off x="5417422" y="2569397"/>
+              <a:ext cx="68580" cy="68580"/>
+            </a:xfrm>
+            <a:prstGeom prst="ellipse">
+              <a:avLst/>
+            </a:prstGeom>
+            <a:ln w="9525" cap="rnd">
+              <a:solidFill>
+                <a:srgbClr val="000000">
+                  <a:alpha val="100000"/>
+                </a:srgbClr>
+              </a:solidFill>
+              <a:prstDash val="solid"/>
+              <a:round/>
+            </a:ln>
+          </p:spPr>
+          <p:txBody>
+            <a:bodyPr/>
+            <a:lstStyle/>
+            <a:p/>
+          </p:txBody>
+        </p:sp>
+        <p:sp>
+          <p:nvSpPr>
+            <p:cNvPr id="65" name="pt65"/>
+            <p:cNvSpPr/>
+            <p:nvPr/>
+          </p:nvSpPr>
+          <p:spPr>
+            <a:xfrm>
+              <a:off x="5483787" y="3658425"/>
+              <a:ext cx="68580" cy="68580"/>
+            </a:xfrm>
+            <a:prstGeom prst="ellipse">
+              <a:avLst/>
+            </a:prstGeom>
+            <a:ln w="9525" cap="rnd">
+              <a:solidFill>
+                <a:srgbClr val="000000">
+                  <a:alpha val="100000"/>
+                </a:srgbClr>
+              </a:solidFill>
+              <a:prstDash val="solid"/>
+              <a:round/>
+            </a:ln>
+          </p:spPr>
+          <p:txBody>
+            <a:bodyPr/>
+            <a:lstStyle/>
+            <a:p/>
+          </p:txBody>
+        </p:sp>
+        <p:sp>
+          <p:nvSpPr>
+            <p:cNvPr id="66" name="pt66"/>
+            <p:cNvSpPr/>
+            <p:nvPr/>
+          </p:nvSpPr>
+          <p:spPr>
+            <a:xfrm>
+              <a:off x="5550152" y="3884397"/>
+              <a:ext cx="68580" cy="68580"/>
+            </a:xfrm>
+            <a:prstGeom prst="ellipse">
+              <a:avLst/>
+            </a:prstGeom>
+            <a:ln w="9525" cap="rnd">
+              <a:solidFill>
+                <a:srgbClr val="000000">
+                  <a:alpha val="100000"/>
+                </a:srgbClr>
+              </a:solidFill>
+              <a:prstDash val="solid"/>
+              <a:round/>
+            </a:ln>
+          </p:spPr>
+          <p:txBody>
+            <a:bodyPr/>
+            <a:lstStyle/>
+            <a:p/>
+          </p:txBody>
+        </p:sp>
+        <p:sp>
+          <p:nvSpPr>
+            <p:cNvPr id="67" name="pt67"/>
+            <p:cNvSpPr/>
+            <p:nvPr/>
+          </p:nvSpPr>
+          <p:spPr>
+            <a:xfrm>
+              <a:off x="5616517" y="4140936"/>
+              <a:ext cx="68580" cy="68580"/>
+            </a:xfrm>
+            <a:prstGeom prst="ellipse">
+              <a:avLst/>
+            </a:prstGeom>
+            <a:ln w="9525" cap="rnd">
+              <a:solidFill>
+                <a:srgbClr val="000000">
+                  <a:alpha val="100000"/>
+                </a:srgbClr>
+              </a:solidFill>
+              <a:prstDash val="solid"/>
+              <a:round/>
+            </a:ln>
+          </p:spPr>
+          <p:txBody>
+            <a:bodyPr/>
+            <a:lstStyle/>
+            <a:p/>
+          </p:txBody>
+        </p:sp>
+        <p:sp>
+          <p:nvSpPr>
+            <p:cNvPr id="68" name="pt68"/>
+            <p:cNvSpPr/>
+            <p:nvPr/>
+          </p:nvSpPr>
+          <p:spPr>
+            <a:xfrm>
+              <a:off x="5682882" y="3606424"/>
+              <a:ext cx="68580" cy="68580"/>
+            </a:xfrm>
+            <a:prstGeom prst="ellipse">
+              <a:avLst/>
+            </a:prstGeom>
+            <a:ln w="9525" cap="rnd">
+              <a:solidFill>
+                <a:srgbClr val="000000">
+                  <a:alpha val="100000"/>
+                </a:srgbClr>
+              </a:solidFill>
+              <a:prstDash val="solid"/>
+              <a:round/>
+            </a:ln>
+          </p:spPr>
+          <p:txBody>
+            <a:bodyPr/>
+            <a:lstStyle/>
+            <a:p/>
+          </p:txBody>
+        </p:sp>
+        <p:sp>
+          <p:nvSpPr>
+            <p:cNvPr id="69" name="pt69"/>
+            <p:cNvSpPr/>
+            <p:nvPr/>
+          </p:nvSpPr>
+          <p:spPr>
+            <a:xfrm>
+              <a:off x="5749247" y="3424825"/>
+              <a:ext cx="68580" cy="68580"/>
+            </a:xfrm>
+            <a:prstGeom prst="ellipse">
+              <a:avLst/>
+            </a:prstGeom>
+            <a:ln w="9525" cap="rnd">
+              <a:solidFill>
+                <a:srgbClr val="000000">
+                  <a:alpha val="100000"/>
+                </a:srgbClr>
+              </a:solidFill>
+              <a:prstDash val="solid"/>
+              <a:round/>
+            </a:ln>
+          </p:spPr>
+          <p:txBody>
+            <a:bodyPr/>
+            <a:lstStyle/>
+            <a:p/>
+          </p:txBody>
+        </p:sp>
+        <p:sp>
+          <p:nvSpPr>
+            <p:cNvPr id="70" name="pt70"/>
+            <p:cNvSpPr/>
+            <p:nvPr/>
+          </p:nvSpPr>
+          <p:spPr>
+            <a:xfrm>
+              <a:off x="5815612" y="3637039"/>
+              <a:ext cx="68580" cy="68580"/>
+            </a:xfrm>
+            <a:prstGeom prst="ellipse">
+              <a:avLst/>
+            </a:prstGeom>
+            <a:ln w="9525" cap="rnd">
+              <a:solidFill>
+                <a:srgbClr val="000000">
+                  <a:alpha val="100000"/>
+                </a:srgbClr>
+              </a:solidFill>
+              <a:prstDash val="solid"/>
+              <a:round/>
+            </a:ln>
+          </p:spPr>
+          <p:txBody>
+            <a:bodyPr/>
+            <a:lstStyle/>
+            <a:p/>
+          </p:txBody>
+        </p:sp>
+        <p:sp>
+          <p:nvSpPr>
+            <p:cNvPr id="71" name="pt71"/>
+            <p:cNvSpPr/>
+            <p:nvPr/>
+          </p:nvSpPr>
+          <p:spPr>
+            <a:xfrm>
+              <a:off x="5881977" y="2600478"/>
+              <a:ext cx="68580" cy="68580"/>
+            </a:xfrm>
+            <a:prstGeom prst="ellipse">
+              <a:avLst/>
+            </a:prstGeom>
+            <a:ln w="9525" cap="rnd">
+              <a:solidFill>
+                <a:srgbClr val="000000">
+                  <a:alpha val="100000"/>
+                </a:srgbClr>
+              </a:solidFill>
+              <a:prstDash val="solid"/>
+              <a:round/>
+            </a:ln>
+          </p:spPr>
+          <p:txBody>
+            <a:bodyPr/>
+            <a:lstStyle/>
+            <a:p/>
+          </p:txBody>
+        </p:sp>
+        <p:sp>
+          <p:nvSpPr>
+            <p:cNvPr id="72" name="pt72"/>
+            <p:cNvSpPr/>
+            <p:nvPr/>
+          </p:nvSpPr>
+          <p:spPr>
+            <a:xfrm>
+              <a:off x="5948342" y="3516958"/>
+              <a:ext cx="68580" cy="68580"/>
+            </a:xfrm>
+            <a:prstGeom prst="ellipse">
+              <a:avLst/>
+            </a:prstGeom>
+            <a:ln w="9525" cap="rnd">
+              <a:solidFill>
+                <a:srgbClr val="000000">
+                  <a:alpha val="100000"/>
+                </a:srgbClr>
+              </a:solidFill>
+              <a:prstDash val="solid"/>
+              <a:round/>
+            </a:ln>
+          </p:spPr>
+          <p:txBody>
+            <a:bodyPr/>
+            <a:lstStyle/>
+            <a:p/>
+          </p:txBody>
+        </p:sp>
+        <p:sp>
+          <p:nvSpPr>
+            <p:cNvPr id="73" name="pt73"/>
+            <p:cNvSpPr/>
+            <p:nvPr/>
+          </p:nvSpPr>
+          <p:spPr>
+            <a:xfrm>
+              <a:off x="6014707" y="3293461"/>
+              <a:ext cx="68580" cy="68580"/>
+            </a:xfrm>
+            <a:prstGeom prst="ellipse">
+              <a:avLst/>
+            </a:prstGeom>
+            <a:ln w="9525" cap="rnd">
+              <a:solidFill>
+                <a:srgbClr val="000000">
+                  <a:alpha val="100000"/>
+                </a:srgbClr>
+              </a:solidFill>
+              <a:prstDash val="solid"/>
+              <a:round/>
+            </a:ln>
+          </p:spPr>
+          <p:txBody>
+            <a:bodyPr/>
+            <a:lstStyle/>
+            <a:p/>
+          </p:txBody>
+        </p:sp>
+        <p:sp>
+          <p:nvSpPr>
+            <p:cNvPr id="74" name="pt74"/>
+            <p:cNvSpPr/>
+            <p:nvPr/>
+          </p:nvSpPr>
+          <p:spPr>
+            <a:xfrm>
+              <a:off x="6081072" y="3180461"/>
+              <a:ext cx="68580" cy="68580"/>
+            </a:xfrm>
+            <a:prstGeom prst="ellipse">
+              <a:avLst/>
+            </a:prstGeom>
+            <a:ln w="9525" cap="rnd">
+              <a:solidFill>
+                <a:srgbClr val="000000">
+                  <a:alpha val="100000"/>
+                </a:srgbClr>
+              </a:solidFill>
+              <a:prstDash val="solid"/>
+              <a:round/>
+            </a:ln>
+          </p:spPr>
+          <p:txBody>
+            <a:bodyPr/>
+            <a:lstStyle/>
+            <a:p/>
+          </p:txBody>
+        </p:sp>
+        <p:sp>
+          <p:nvSpPr>
+            <p:cNvPr id="75" name="pt75"/>
+            <p:cNvSpPr/>
+            <p:nvPr/>
+          </p:nvSpPr>
+          <p:spPr>
+            <a:xfrm>
+              <a:off x="6147437" y="3775030"/>
+              <a:ext cx="68580" cy="68580"/>
+            </a:xfrm>
+            <a:prstGeom prst="ellipse">
+              <a:avLst/>
+            </a:prstGeom>
+            <a:ln w="9525" cap="rnd">
+              <a:solidFill>
+                <a:srgbClr val="000000">
+                  <a:alpha val="100000"/>
+                </a:srgbClr>
+              </a:solidFill>
+              <a:prstDash val="solid"/>
+              <a:round/>
+            </a:ln>
+          </p:spPr>
+          <p:txBody>
+            <a:bodyPr/>
+            <a:lstStyle/>
+            <a:p/>
+          </p:txBody>
+        </p:sp>
+        <p:sp>
+          <p:nvSpPr>
+            <p:cNvPr id="76" name="pt76"/>
+            <p:cNvSpPr/>
+            <p:nvPr/>
+          </p:nvSpPr>
+          <p:spPr>
+            <a:xfrm>
+              <a:off x="6213802" y="3413477"/>
+              <a:ext cx="68580" cy="68580"/>
+            </a:xfrm>
+            <a:prstGeom prst="ellipse">
+              <a:avLst/>
+            </a:prstGeom>
+            <a:ln w="9525" cap="rnd">
+              <a:solidFill>
+                <a:srgbClr val="000000">
+                  <a:alpha val="100000"/>
+                </a:srgbClr>
+              </a:solidFill>
+              <a:prstDash val="solid"/>
+              <a:round/>
+            </a:ln>
+          </p:spPr>
+          <p:txBody>
+            <a:bodyPr/>
+            <a:lstStyle/>
+            <a:p/>
+          </p:txBody>
+        </p:sp>
+        <p:sp>
+          <p:nvSpPr>
+            <p:cNvPr id="77" name="pt77"/>
+            <p:cNvSpPr/>
+            <p:nvPr/>
+          </p:nvSpPr>
+          <p:spPr>
+            <a:xfrm>
+              <a:off x="6280167" y="3379668"/>
+              <a:ext cx="68580" cy="68580"/>
+            </a:xfrm>
+            <a:prstGeom prst="ellipse">
+              <a:avLst/>
+            </a:prstGeom>
+            <a:ln w="9525" cap="rnd">
+              <a:solidFill>
+                <a:srgbClr val="000000">
+                  <a:alpha val="100000"/>
+                </a:srgbClr>
+              </a:solidFill>
+              <a:prstDash val="solid"/>
+              <a:round/>
+            </a:ln>
+          </p:spPr>
+          <p:txBody>
+            <a:bodyPr/>
+            <a:lstStyle/>
+            <a:p/>
+          </p:txBody>
+        </p:sp>
+        <p:sp>
+          <p:nvSpPr>
+            <p:cNvPr id="78" name="pt78"/>
+            <p:cNvSpPr/>
+            <p:nvPr/>
+          </p:nvSpPr>
+          <p:spPr>
+            <a:xfrm>
+              <a:off x="6346532" y="3564309"/>
+              <a:ext cx="68580" cy="68580"/>
+            </a:xfrm>
+            <a:prstGeom prst="ellipse">
+              <a:avLst/>
+            </a:prstGeom>
+            <a:ln w="9525" cap="rnd">
+              <a:solidFill>
+                <a:srgbClr val="000000">
+                  <a:alpha val="100000"/>
+                </a:srgbClr>
+              </a:solidFill>
+              <a:prstDash val="solid"/>
+              <a:round/>
+            </a:ln>
+          </p:spPr>
+          <p:txBody>
+            <a:bodyPr/>
+            <a:lstStyle/>
+            <a:p/>
+          </p:txBody>
+        </p:sp>
+        <p:sp>
+          <p:nvSpPr>
+            <p:cNvPr id="79" name="pt79"/>
+            <p:cNvSpPr/>
+            <p:nvPr/>
+          </p:nvSpPr>
+          <p:spPr>
+            <a:xfrm>
+              <a:off x="6412897" y="3040253"/>
+              <a:ext cx="68580" cy="68580"/>
+            </a:xfrm>
+            <a:prstGeom prst="ellipse">
+              <a:avLst/>
+            </a:prstGeom>
+            <a:ln w="9525" cap="rnd">
+              <a:solidFill>
+                <a:srgbClr val="000000">
+                  <a:alpha val="100000"/>
+                </a:srgbClr>
+              </a:solidFill>
+              <a:prstDash val="solid"/>
+              <a:round/>
+            </a:ln>
+          </p:spPr>
+          <p:txBody>
+            <a:bodyPr/>
+            <a:lstStyle/>
+            <a:p/>
+          </p:txBody>
+        </p:sp>
+        <p:sp>
+          <p:nvSpPr>
+            <p:cNvPr id="80" name="pt80"/>
+            <p:cNvSpPr/>
+            <p:nvPr/>
+          </p:nvSpPr>
+          <p:spPr>
+            <a:xfrm>
+              <a:off x="6479262" y="3550098"/>
+              <a:ext cx="68580" cy="68580"/>
+            </a:xfrm>
+            <a:prstGeom prst="ellipse">
+              <a:avLst/>
+            </a:prstGeom>
+            <a:ln w="9525" cap="rnd">
+              <a:solidFill>
+                <a:srgbClr val="000000">
+                  <a:alpha val="100000"/>
+                </a:srgbClr>
+              </a:solidFill>
+              <a:prstDash val="solid"/>
+              <a:round/>
+            </a:ln>
+          </p:spPr>
+          <p:txBody>
+            <a:bodyPr/>
+            <a:lstStyle/>
+            <a:p/>
+          </p:txBody>
+        </p:sp>
+        <p:sp>
+          <p:nvSpPr>
+            <p:cNvPr id="81" name="pt81"/>
+            <p:cNvSpPr/>
+            <p:nvPr/>
+          </p:nvSpPr>
+          <p:spPr>
+            <a:xfrm>
+              <a:off x="6545627" y="3618134"/>
+              <a:ext cx="68580" cy="68580"/>
+            </a:xfrm>
+            <a:prstGeom prst="ellipse">
+              <a:avLst/>
+            </a:prstGeom>
+            <a:ln w="9525" cap="rnd">
+              <a:solidFill>
+                <a:srgbClr val="000000">
+                  <a:alpha val="100000"/>
+                </a:srgbClr>
+              </a:solidFill>
+              <a:prstDash val="solid"/>
+              <a:round/>
+            </a:ln>
+          </p:spPr>
+          <p:txBody>
+            <a:bodyPr/>
+            <a:lstStyle/>
+            <a:p/>
+          </p:txBody>
+        </p:sp>
+        <p:sp>
+          <p:nvSpPr>
+            <p:cNvPr id="82" name="pt82"/>
+            <p:cNvSpPr/>
+            <p:nvPr/>
+          </p:nvSpPr>
+          <p:spPr>
+            <a:xfrm>
+              <a:off x="6611992" y="2921511"/>
+              <a:ext cx="68580" cy="68580"/>
+            </a:xfrm>
+            <a:prstGeom prst="ellipse">
+              <a:avLst/>
+            </a:prstGeom>
+            <a:ln w="9525" cap="rnd">
+              <a:solidFill>
+                <a:srgbClr val="000000">
+                  <a:alpha val="100000"/>
+                </a:srgbClr>
+              </a:solidFill>
+              <a:prstDash val="solid"/>
+              <a:round/>
+            </a:ln>
+          </p:spPr>
+          <p:txBody>
+            <a:bodyPr/>
+            <a:lstStyle/>
+            <a:p/>
+          </p:txBody>
+        </p:sp>
+        <p:sp>
+          <p:nvSpPr>
+            <p:cNvPr id="83" name="pt83"/>
+            <p:cNvSpPr/>
+            <p:nvPr/>
+          </p:nvSpPr>
+          <p:spPr>
+            <a:xfrm>
+              <a:off x="6678357" y="2715963"/>
+              <a:ext cx="68580" cy="68580"/>
+            </a:xfrm>
+            <a:prstGeom prst="ellipse">
+              <a:avLst/>
+            </a:prstGeom>
+            <a:ln w="9525" cap="rnd">
+              <a:solidFill>
+                <a:srgbClr val="000000">
+                  <a:alpha val="100000"/>
+                </a:srgbClr>
+              </a:solidFill>
+              <a:prstDash val="solid"/>
+              <a:round/>
+            </a:ln>
+          </p:spPr>
+          <p:txBody>
+            <a:bodyPr/>
+            <a:lstStyle/>
+            <a:p/>
+          </p:txBody>
+        </p:sp>
+        <p:sp>
+          <p:nvSpPr>
+            <p:cNvPr id="84" name="pt84"/>
+            <p:cNvSpPr/>
+            <p:nvPr/>
+          </p:nvSpPr>
+          <p:spPr>
+            <a:xfrm>
+              <a:off x="6744721" y="3868597"/>
+              <a:ext cx="68580" cy="68580"/>
+            </a:xfrm>
+            <a:prstGeom prst="ellipse">
+              <a:avLst/>
+            </a:prstGeom>
+            <a:ln w="9525" cap="rnd">
+              <a:solidFill>
+                <a:srgbClr val="000000">
+                  <a:alpha val="100000"/>
+                </a:srgbClr>
+              </a:solidFill>
+              <a:prstDash val="solid"/>
+              <a:round/>
+            </a:ln>
+          </p:spPr>
+          <p:txBody>
+            <a:bodyPr/>
+            <a:lstStyle/>
+            <a:p/>
+          </p:txBody>
+        </p:sp>
+        <p:sp>
+          <p:nvSpPr>
+            <p:cNvPr id="85" name="pt85"/>
+            <p:cNvSpPr/>
+            <p:nvPr/>
+          </p:nvSpPr>
+          <p:spPr>
+            <a:xfrm>
+              <a:off x="6811086" y="3385393"/>
+              <a:ext cx="68580" cy="68580"/>
+            </a:xfrm>
+            <a:prstGeom prst="ellipse">
+              <a:avLst/>
+            </a:prstGeom>
+            <a:ln w="9525" cap="rnd">
+              <a:solidFill>
+                <a:srgbClr val="000000">
+                  <a:alpha val="100000"/>
+                </a:srgbClr>
+              </a:solidFill>
+              <a:prstDash val="solid"/>
+              <a:round/>
+            </a:ln>
+          </p:spPr>
+          <p:txBody>
+            <a:bodyPr/>
+            <a:lstStyle/>
+            <a:p/>
+          </p:txBody>
+        </p:sp>
+        <p:sp>
+          <p:nvSpPr>
+            <p:cNvPr id="86" name="pt86"/>
+            <p:cNvSpPr/>
+            <p:nvPr/>
+          </p:nvSpPr>
+          <p:spPr>
+            <a:xfrm>
+              <a:off x="6877451" y="2842320"/>
+              <a:ext cx="68580" cy="68580"/>
+            </a:xfrm>
+            <a:prstGeom prst="ellipse">
+              <a:avLst/>
+            </a:prstGeom>
+            <a:ln w="9525" cap="rnd">
+              <a:solidFill>
+                <a:srgbClr val="000000">
+                  <a:alpha val="100000"/>
+                </a:srgbClr>
+              </a:solidFill>
+              <a:prstDash val="solid"/>
+              <a:round/>
+            </a:ln>
+          </p:spPr>
+          <p:txBody>
+            <a:bodyPr/>
+            <a:lstStyle/>
+            <a:p/>
+          </p:txBody>
+        </p:sp>
+        <p:sp>
+          <p:nvSpPr>
+            <p:cNvPr id="87" name="pt87"/>
+            <p:cNvSpPr/>
+            <p:nvPr/>
+          </p:nvSpPr>
+          <p:spPr>
+            <a:xfrm>
+              <a:off x="6943816" y="2853710"/>
+              <a:ext cx="68580" cy="68580"/>
+            </a:xfrm>
+            <a:prstGeom prst="ellipse">
+              <a:avLst/>
+            </a:prstGeom>
+            <a:ln w="9525" cap="rnd">
+              <a:solidFill>
+                <a:srgbClr val="000000">
+                  <a:alpha val="100000"/>
+                </a:srgbClr>
+              </a:solidFill>
+              <a:prstDash val="solid"/>
+              <a:round/>
+            </a:ln>
+          </p:spPr>
+          <p:txBody>
+            <a:bodyPr/>
+            <a:lstStyle/>
+            <a:p/>
+          </p:txBody>
+        </p:sp>
+        <p:sp>
+          <p:nvSpPr>
+            <p:cNvPr id="88" name="pt88"/>
+            <p:cNvSpPr/>
+            <p:nvPr/>
+          </p:nvSpPr>
+          <p:spPr>
+            <a:xfrm>
+              <a:off x="7010181" y="3467179"/>
+              <a:ext cx="68580" cy="68580"/>
+            </a:xfrm>
+            <a:prstGeom prst="ellipse">
+              <a:avLst/>
+            </a:prstGeom>
+            <a:ln w="9525" cap="rnd">
+              <a:solidFill>
+                <a:srgbClr val="000000">
+                  <a:alpha val="100000"/>
+                </a:srgbClr>
+              </a:solidFill>
+              <a:prstDash val="solid"/>
+              <a:round/>
+            </a:ln>
+          </p:spPr>
+          <p:txBody>
+            <a:bodyPr/>
+            <a:lstStyle/>
+            <a:p/>
+          </p:txBody>
+        </p:sp>
+        <p:sp>
+          <p:nvSpPr>
+            <p:cNvPr id="89" name="pt89"/>
+            <p:cNvSpPr/>
+            <p:nvPr/>
+          </p:nvSpPr>
+          <p:spPr>
+            <a:xfrm>
+              <a:off x="7076546" y="3940166"/>
+              <a:ext cx="68580" cy="68580"/>
+            </a:xfrm>
+            <a:prstGeom prst="ellipse">
+              <a:avLst/>
+            </a:prstGeom>
+            <a:ln w="9525" cap="rnd">
+              <a:solidFill>
+                <a:srgbClr val="000000">
+                  <a:alpha val="100000"/>
+                </a:srgbClr>
+              </a:solidFill>
+              <a:prstDash val="solid"/>
+              <a:round/>
+            </a:ln>
+          </p:spPr>
+          <p:txBody>
+            <a:bodyPr/>
+            <a:lstStyle/>
+            <a:p/>
+          </p:txBody>
+        </p:sp>
+        <p:sp>
+          <p:nvSpPr>
+            <p:cNvPr id="90" name="pt90"/>
+            <p:cNvSpPr/>
+            <p:nvPr/>
+          </p:nvSpPr>
+          <p:spPr>
+            <a:xfrm>
+              <a:off x="7142911" y="3271699"/>
+              <a:ext cx="68580" cy="68580"/>
+            </a:xfrm>
+            <a:prstGeom prst="ellipse">
+              <a:avLst/>
+            </a:prstGeom>
+            <a:ln w="9525" cap="rnd">
+              <a:solidFill>
+                <a:srgbClr val="000000">
+                  <a:alpha val="100000"/>
+                </a:srgbClr>
+              </a:solidFill>
+              <a:prstDash val="solid"/>
+              <a:round/>
+            </a:ln>
+          </p:spPr>
+          <p:txBody>
+            <a:bodyPr/>
+            <a:lstStyle/>
+            <a:p/>
+          </p:txBody>
+        </p:sp>
+        <p:sp>
+          <p:nvSpPr>
+            <p:cNvPr id="91" name="pt91"/>
+            <p:cNvSpPr/>
+            <p:nvPr/>
+          </p:nvSpPr>
+          <p:spPr>
+            <a:xfrm>
+              <a:off x="7209276" y="2421031"/>
+              <a:ext cx="68580" cy="68580"/>
+            </a:xfrm>
+            <a:prstGeom prst="ellipse">
+              <a:avLst/>
+            </a:prstGeom>
+            <a:ln w="9525" cap="rnd">
+              <a:solidFill>
+                <a:srgbClr val="000000">
+                  <a:alpha val="100000"/>
+                </a:srgbClr>
+              </a:solidFill>
+              <a:prstDash val="solid"/>
+              <a:round/>
+            </a:ln>
+          </p:spPr>
+          <p:txBody>
+            <a:bodyPr/>
+            <a:lstStyle/>
+            <a:p/>
+          </p:txBody>
+        </p:sp>
+        <p:sp>
+          <p:nvSpPr>
+            <p:cNvPr id="92" name="pt92"/>
+            <p:cNvSpPr/>
+            <p:nvPr/>
+          </p:nvSpPr>
+          <p:spPr>
+            <a:xfrm>
+              <a:off x="7275641" y="4091819"/>
+              <a:ext cx="68580" cy="68580"/>
+            </a:xfrm>
+            <a:prstGeom prst="ellipse">
+              <a:avLst/>
+            </a:prstGeom>
+            <a:ln w="9525" cap="rnd">
+              <a:solidFill>
+                <a:srgbClr val="000000">
+                  <a:alpha val="100000"/>
+                </a:srgbClr>
+              </a:solidFill>
+              <a:prstDash val="solid"/>
+              <a:round/>
+            </a:ln>
+          </p:spPr>
+          <p:txBody>
+            <a:bodyPr/>
+            <a:lstStyle/>
+            <a:p/>
+          </p:txBody>
+        </p:sp>
+        <p:sp>
+          <p:nvSpPr>
+            <p:cNvPr id="93" name="pt93"/>
+            <p:cNvSpPr/>
+            <p:nvPr/>
+          </p:nvSpPr>
+          <p:spPr>
+            <a:xfrm>
+              <a:off x="7342006" y="3733780"/>
+              <a:ext cx="68580" cy="68580"/>
+            </a:xfrm>
+            <a:prstGeom prst="ellipse">
+              <a:avLst/>
+            </a:prstGeom>
+            <a:ln w="9525" cap="rnd">
+              <a:solidFill>
+                <a:srgbClr val="000000">
+                  <a:alpha val="100000"/>
+                </a:srgbClr>
+              </a:solidFill>
+              <a:prstDash val="solid"/>
+              <a:round/>
+            </a:ln>
+          </p:spPr>
+          <p:txBody>
+            <a:bodyPr/>
+            <a:lstStyle/>
+            <a:p/>
+          </p:txBody>
+        </p:sp>
+        <p:sp>
+          <p:nvSpPr>
+            <p:cNvPr id="94" name="pt94"/>
+            <p:cNvSpPr/>
+            <p:nvPr/>
+          </p:nvSpPr>
+          <p:spPr>
+            <a:xfrm>
+              <a:off x="7408371" y="3761809"/>
+              <a:ext cx="68580" cy="68580"/>
+            </a:xfrm>
+            <a:prstGeom prst="ellipse">
+              <a:avLst/>
+            </a:prstGeom>
+            <a:ln w="9525" cap="rnd">
+              <a:solidFill>
+                <a:srgbClr val="000000">
+                  <a:alpha val="100000"/>
+                </a:srgbClr>
+              </a:solidFill>
+              <a:prstDash val="solid"/>
+              <a:round/>
+            </a:ln>
+          </p:spPr>
+          <p:txBody>
+            <a:bodyPr/>
+            <a:lstStyle/>
+            <a:p/>
+          </p:txBody>
+        </p:sp>
+        <p:sp>
+          <p:nvSpPr>
+            <p:cNvPr id="95" name="pt95"/>
+            <p:cNvSpPr/>
+            <p:nvPr/>
+          </p:nvSpPr>
+          <p:spPr>
+            <a:xfrm>
+              <a:off x="7474736" y="3737505"/>
+              <a:ext cx="68580" cy="68580"/>
+            </a:xfrm>
+            <a:prstGeom prst="ellipse">
+              <a:avLst/>
+            </a:prstGeom>
+            <a:ln w="9525" cap="rnd">
+              <a:solidFill>
+                <a:srgbClr val="000000">
+                  <a:alpha val="100000"/>
+                </a:srgbClr>
+              </a:solidFill>
+              <a:prstDash val="solid"/>
+              <a:round/>
+            </a:ln>
+          </p:spPr>
+          <p:txBody>
+            <a:bodyPr/>
+            <a:lstStyle/>
+            <a:p/>
+          </p:txBody>
+        </p:sp>
+        <p:sp>
+          <p:nvSpPr>
+            <p:cNvPr id="96" name="pt96"/>
+            <p:cNvSpPr/>
+            <p:nvPr/>
+          </p:nvSpPr>
+          <p:spPr>
+            <a:xfrm>
+              <a:off x="7541101" y="3618822"/>
+              <a:ext cx="68580" cy="68580"/>
+            </a:xfrm>
+            <a:prstGeom prst="ellipse">
+              <a:avLst/>
+            </a:prstGeom>
+            <a:ln w="9525" cap="rnd">
+              <a:solidFill>
+                <a:srgbClr val="000000">
+                  <a:alpha val="100000"/>
+                </a:srgbClr>
+              </a:solidFill>
+              <a:prstDash val="solid"/>
+              <a:round/>
+            </a:ln>
+          </p:spPr>
+          <p:txBody>
+            <a:bodyPr/>
+            <a:lstStyle/>
+            <a:p/>
+          </p:txBody>
+        </p:sp>
+        <p:sp>
+          <p:nvSpPr>
+            <p:cNvPr id="97" name="pt97"/>
+            <p:cNvSpPr/>
+            <p:nvPr/>
+          </p:nvSpPr>
+          <p:spPr>
+            <a:xfrm>
+              <a:off x="7607466" y="2713807"/>
+              <a:ext cx="68580" cy="68580"/>
+            </a:xfrm>
+            <a:prstGeom prst="ellipse">
+              <a:avLst/>
+            </a:prstGeom>
+            <a:ln w="9525" cap="rnd">
+              <a:solidFill>
+                <a:srgbClr val="000000">
+                  <a:alpha val="100000"/>
+                </a:srgbClr>
+              </a:solidFill>
+              <a:prstDash val="solid"/>
+              <a:round/>
+            </a:ln>
+          </p:spPr>
+          <p:txBody>
+            <a:bodyPr/>
+            <a:lstStyle/>
+            <a:p/>
+          </p:txBody>
+        </p:sp>
+        <p:sp>
+          <p:nvSpPr>
+            <p:cNvPr id="98" name="pt98"/>
+            <p:cNvSpPr/>
+            <p:nvPr/>
+          </p:nvSpPr>
+          <p:spPr>
+            <a:xfrm>
+              <a:off x="7673831" y="3957347"/>
+              <a:ext cx="68580" cy="68580"/>
+            </a:xfrm>
+            <a:prstGeom prst="ellipse">
+              <a:avLst/>
+            </a:prstGeom>
+            <a:ln w="9525" cap="rnd">
+              <a:solidFill>
+                <a:srgbClr val="000000">
+                  <a:alpha val="100000"/>
+                </a:srgbClr>
+              </a:solidFill>
+              <a:prstDash val="solid"/>
+              <a:round/>
+            </a:ln>
+          </p:spPr>
+          <p:txBody>
+            <a:bodyPr/>
+            <a:lstStyle/>
+            <a:p/>
+          </p:txBody>
+        </p:sp>
+        <p:sp>
+          <p:nvSpPr>
+            <p:cNvPr id="99" name="pt99"/>
+            <p:cNvSpPr/>
+            <p:nvPr/>
+          </p:nvSpPr>
+          <p:spPr>
+            <a:xfrm>
+              <a:off x="7740196" y="3697394"/>
+              <a:ext cx="68580" cy="68580"/>
+            </a:xfrm>
+            <a:prstGeom prst="ellipse">
+              <a:avLst/>
+            </a:prstGeom>
+            <a:ln w="9525" cap="rnd">
+              <a:solidFill>
+                <a:srgbClr val="000000">
+                  <a:alpha val="100000"/>
+                </a:srgbClr>
+              </a:solidFill>
+              <a:prstDash val="solid"/>
+              <a:round/>
+            </a:ln>
+          </p:spPr>
+          <p:txBody>
+            <a:bodyPr/>
+            <a:lstStyle/>
+            <a:p/>
+          </p:txBody>
+        </p:sp>
+        <p:sp>
+          <p:nvSpPr>
+            <p:cNvPr id="100" name="pt100"/>
+            <p:cNvSpPr/>
+            <p:nvPr/>
+          </p:nvSpPr>
+          <p:spPr>
+            <a:xfrm>
+              <a:off x="7806561" y="3603278"/>
+              <a:ext cx="68580" cy="68580"/>
+            </a:xfrm>
+            <a:prstGeom prst="ellipse">
+              <a:avLst/>
+            </a:prstGeom>
+            <a:ln w="9525" cap="rnd">
+              <a:solidFill>
+                <a:srgbClr val="000000">
+                  <a:alpha val="100000"/>
+                </a:srgbClr>
+              </a:solidFill>
+              <a:prstDash val="solid"/>
+              <a:round/>
+            </a:ln>
+          </p:spPr>
+          <p:txBody>
+            <a:bodyPr/>
+            <a:lstStyle/>
+            <a:p/>
+          </p:txBody>
+        </p:sp>
+        <p:sp>
+          <p:nvSpPr>
+            <p:cNvPr id="101" name="pt101"/>
+            <p:cNvSpPr/>
+            <p:nvPr/>
+          </p:nvSpPr>
+          <p:spPr>
+            <a:xfrm>
+              <a:off x="7872926" y="3102303"/>
+              <a:ext cx="68580" cy="68580"/>
+            </a:xfrm>
+            <a:prstGeom prst="ellipse">
+              <a:avLst/>
+            </a:prstGeom>
+            <a:ln w="9525" cap="rnd">
+              <a:solidFill>
+                <a:srgbClr val="000000">
+                  <a:alpha val="100000"/>
+                </a:srgbClr>
+              </a:solidFill>
+              <a:prstDash val="solid"/>
+              <a:round/>
+            </a:ln>
+          </p:spPr>
+          <p:txBody>
+            <a:bodyPr/>
+            <a:lstStyle/>
+            <a:p/>
+          </p:txBody>
+        </p:sp>
+        <p:sp>
+          <p:nvSpPr>
+            <p:cNvPr id="102" name="pt102"/>
+            <p:cNvSpPr/>
+            <p:nvPr/>
+          </p:nvSpPr>
+          <p:spPr>
+            <a:xfrm>
+              <a:off x="7939291" y="4299410"/>
+              <a:ext cx="68580" cy="68580"/>
+            </a:xfrm>
+            <a:prstGeom prst="ellipse">
+              <a:avLst/>
+            </a:prstGeom>
+            <a:ln w="9525" cap="rnd">
+              <a:solidFill>
+                <a:srgbClr val="000000">
+                  <a:alpha val="100000"/>
+                </a:srgbClr>
+              </a:solidFill>
+              <a:prstDash val="solid"/>
+              <a:round/>
+            </a:ln>
+          </p:spPr>
+          <p:txBody>
+            <a:bodyPr/>
+            <a:lstStyle/>
+            <a:p/>
+          </p:txBody>
+        </p:sp>
+        <p:sp>
+          <p:nvSpPr>
+            <p:cNvPr id="103" name="pt103"/>
+            <p:cNvSpPr/>
+            <p:nvPr/>
+          </p:nvSpPr>
+          <p:spPr>
+            <a:xfrm>
+              <a:off x="8005656" y="2873392"/>
+              <a:ext cx="68580" cy="68580"/>
+            </a:xfrm>
+            <a:prstGeom prst="ellipse">
+              <a:avLst/>
+            </a:prstGeom>
+            <a:ln w="9525" cap="rnd">
+              <a:solidFill>
+                <a:srgbClr val="000000">
+                  <a:alpha val="100000"/>
+                </a:srgbClr>
+              </a:solidFill>
+              <a:prstDash val="solid"/>
+              <a:round/>
+            </a:ln>
+          </p:spPr>
+          <p:txBody>
+            <a:bodyPr/>
+            <a:lstStyle/>
+            <a:p/>
+          </p:txBody>
+        </p:sp>
+        <p:sp>
+          <p:nvSpPr>
+            <p:cNvPr id="104" name="pl104"/>
+            <p:cNvSpPr/>
+            <p:nvPr/>
+          </p:nvSpPr>
+          <p:spPr>
+            <a:xfrm>
+              <a:off x="1403448" y="5193474"/>
+              <a:ext cx="6636498" cy="0"/>
+            </a:xfrm>
+            <a:custGeom>
+              <a:avLst/>
+              <a:pathLst>
+                <a:path w="6636498" h="0">
+                  <a:moveTo>
+                    <a:pt x="0" y="0"/>
+                  </a:moveTo>
+                  <a:lnTo>
+                    <a:pt x="6636498" y="0"/>
+                  </a:lnTo>
+                </a:path>
+              </a:pathLst>
+            </a:custGeom>
+            <a:ln w="9525" cap="rnd">
+              <a:solidFill>
+                <a:srgbClr val="000000">
+                  <a:alpha val="100000"/>
+                </a:srgbClr>
+              </a:solidFill>
+              <a:prstDash val="solid"/>
+              <a:round/>
+            </a:ln>
+          </p:spPr>
+          <p:txBody>
+            <a:bodyPr/>
+            <a:lstStyle/>
+            <a:p/>
+          </p:txBody>
+        </p:sp>
+        <p:sp>
+          <p:nvSpPr>
+            <p:cNvPr id="105" name="pl105"/>
+            <p:cNvSpPr/>
+            <p:nvPr/>
+          </p:nvSpPr>
+          <p:spPr>
+            <a:xfrm>
+              <a:off x="1403448" y="5193474"/>
+              <a:ext cx="0" cy="91439"/>
+            </a:xfrm>
+            <a:custGeom>
+              <a:avLst/>
+              <a:pathLst>
+                <a:path w="0" h="91439">
+                  <a:moveTo>
+                    <a:pt x="0" y="0"/>
+                  </a:moveTo>
+                  <a:lnTo>
+                    <a:pt x="0" y="91439"/>
+                  </a:lnTo>
+                </a:path>
+              </a:pathLst>
+            </a:custGeom>
+            <a:ln w="9525" cap="rnd">
+              <a:solidFill>
+                <a:srgbClr val="000000">
+                  <a:alpha val="100000"/>
+                </a:srgbClr>
+              </a:solidFill>
+              <a:prstDash val="solid"/>
+              <a:round/>
+            </a:ln>
+          </p:spPr>
+          <p:txBody>
+            <a:bodyPr/>
+            <a:lstStyle/>
+            <a:p/>
+          </p:txBody>
+        </p:sp>
+        <p:sp>
+          <p:nvSpPr>
+            <p:cNvPr id="106" name="pl106"/>
+            <p:cNvSpPr/>
+            <p:nvPr/>
+          </p:nvSpPr>
+          <p:spPr>
+            <a:xfrm>
+              <a:off x="2730748" y="5193474"/>
+              <a:ext cx="0" cy="91439"/>
+            </a:xfrm>
+            <a:custGeom>
+              <a:avLst/>
+              <a:pathLst>
+                <a:path w="0" h="91439">
+                  <a:moveTo>
+                    <a:pt x="0" y="0"/>
+                  </a:moveTo>
+                  <a:lnTo>
+                    <a:pt x="0" y="91439"/>
+                  </a:lnTo>
+                </a:path>
+              </a:pathLst>
+            </a:custGeom>
+            <a:ln w="9525" cap="rnd">
+              <a:solidFill>
+                <a:srgbClr val="000000">
+                  <a:alpha val="100000"/>
+                </a:srgbClr>
+              </a:solidFill>
+              <a:prstDash val="solid"/>
+              <a:round/>
+            </a:ln>
+          </p:spPr>
+          <p:txBody>
+            <a:bodyPr/>
+            <a:lstStyle/>
+            <a:p/>
+          </p:txBody>
+        </p:sp>
+        <p:sp>
+          <p:nvSpPr>
+            <p:cNvPr id="107" name="pl107"/>
+            <p:cNvSpPr/>
+            <p:nvPr/>
+          </p:nvSpPr>
+          <p:spPr>
+            <a:xfrm>
+              <a:off x="4058047" y="5193474"/>
+              <a:ext cx="0" cy="91439"/>
+            </a:xfrm>
+            <a:custGeom>
+              <a:avLst/>
+              <a:pathLst>
+                <a:path w="0" h="91439">
+                  <a:moveTo>
+                    <a:pt x="0" y="0"/>
+                  </a:moveTo>
+                  <a:lnTo>
+                    <a:pt x="0" y="91439"/>
+                  </a:lnTo>
+                </a:path>
+              </a:pathLst>
+            </a:custGeom>
+            <a:ln w="9525" cap="rnd">
+              <a:solidFill>
+                <a:srgbClr val="000000">
+                  <a:alpha val="100000"/>
+                </a:srgbClr>
+              </a:solidFill>
+              <a:prstDash val="solid"/>
+              <a:round/>
+            </a:ln>
+          </p:spPr>
+          <p:txBody>
+            <a:bodyPr/>
+            <a:lstStyle/>
+            <a:p/>
+          </p:txBody>
+        </p:sp>
+        <p:sp>
+          <p:nvSpPr>
+            <p:cNvPr id="108" name="pl108"/>
+            <p:cNvSpPr/>
+            <p:nvPr/>
+          </p:nvSpPr>
+          <p:spPr>
+            <a:xfrm>
+              <a:off x="5385347" y="5193474"/>
+              <a:ext cx="0" cy="91439"/>
+            </a:xfrm>
+            <a:custGeom>
+              <a:avLst/>
+              <a:pathLst>
+                <a:path w="0" h="91439">
+                  <a:moveTo>
+                    <a:pt x="0" y="0"/>
+                  </a:moveTo>
+                  <a:lnTo>
+                    <a:pt x="0" y="91439"/>
+                  </a:lnTo>
+                </a:path>
+              </a:pathLst>
+            </a:custGeom>
+            <a:ln w="9525" cap="rnd">
+              <a:solidFill>
+                <a:srgbClr val="000000">
+                  <a:alpha val="100000"/>
+                </a:srgbClr>
+              </a:solidFill>
+              <a:prstDash val="solid"/>
+              <a:round/>
+            </a:ln>
+          </p:spPr>
+          <p:txBody>
+            <a:bodyPr/>
+            <a:lstStyle/>
+            <a:p/>
+          </p:txBody>
+        </p:sp>
+        <p:sp>
+          <p:nvSpPr>
+            <p:cNvPr id="109" name="pl109"/>
+            <p:cNvSpPr/>
+            <p:nvPr/>
+          </p:nvSpPr>
+          <p:spPr>
+            <a:xfrm>
+              <a:off x="6712647" y="5193474"/>
+              <a:ext cx="0" cy="91439"/>
+            </a:xfrm>
+            <a:custGeom>
+              <a:avLst/>
+              <a:pathLst>
+                <a:path w="0" h="91439">
+                  <a:moveTo>
+                    <a:pt x="0" y="0"/>
+                  </a:moveTo>
+                  <a:lnTo>
+                    <a:pt x="0" y="91439"/>
+                  </a:lnTo>
+                </a:path>
+              </a:pathLst>
+            </a:custGeom>
+            <a:ln w="9525" cap="rnd">
+              <a:solidFill>
+                <a:srgbClr val="000000">
+                  <a:alpha val="100000"/>
+                </a:srgbClr>
+              </a:solidFill>
+              <a:prstDash val="solid"/>
+              <a:round/>
+            </a:ln>
+          </p:spPr>
+          <p:txBody>
+            <a:bodyPr/>
+            <a:lstStyle/>
+            <a:p/>
+          </p:txBody>
+        </p:sp>
+        <p:sp>
+          <p:nvSpPr>
+            <p:cNvPr id="110" name="pl110"/>
+            <p:cNvSpPr/>
+            <p:nvPr/>
+          </p:nvSpPr>
+          <p:spPr>
+            <a:xfrm>
+              <a:off x="8039946" y="5193474"/>
+              <a:ext cx="0" cy="91439"/>
+            </a:xfrm>
+            <a:custGeom>
+              <a:avLst/>
+              <a:pathLst>
+                <a:path w="0" h="91439">
+                  <a:moveTo>
+                    <a:pt x="0" y="0"/>
+                  </a:moveTo>
+                  <a:lnTo>
+                    <a:pt x="0" y="91439"/>
+                  </a:lnTo>
+                </a:path>
+              </a:pathLst>
+            </a:custGeom>
+            <a:ln w="9525" cap="rnd">
+              <a:solidFill>
+                <a:srgbClr val="000000">
+                  <a:alpha val="100000"/>
+                </a:srgbClr>
+              </a:solidFill>
+              <a:prstDash val="solid"/>
+              <a:round/>
+            </a:ln>
+          </p:spPr>
+          <p:txBody>
+            <a:bodyPr/>
+            <a:lstStyle/>
+            <a:p/>
+          </p:txBody>
+        </p:sp>
+        <p:sp>
+          <p:nvSpPr>
+            <p:cNvPr id="111" name="tx111"/>
+            <p:cNvSpPr/>
+            <p:nvPr/>
+          </p:nvSpPr>
+          <p:spPr>
+            <a:xfrm>
+              <a:off x="1361069" y="5411335"/>
+              <a:ext cx="84757" cy="111323"/>
+            </a:xfrm>
+            <a:prstGeom prst="rect">
+              <a:avLst/>
+            </a:prstGeom>
+            <a:noFill/>
+          </p:spPr>
+          <p:txBody>
+            <a:bodyPr lIns="0" rIns="0" tIns="0" bIns="0" anchorCtr="1" anchor="ctr" wrap="none"/>
+            <a:lstStyle/>
+            <a:p>
+              <a:pPr algn="l" marL="0" marR="0" indent="0">
+                <a:lnSpc>
+                  <a:spcPts val="1200"/>
+                </a:lnSpc>
+                <a:spcBef>
+                  <a:spcPts val="0"/>
+                </a:spcBef>
+                <a:spcAft>
+                  <a:spcPts val="0"/>
+                </a:spcAft>
+              </a:pPr>
+              <a:r>
+                <a:rPr sz="1200">
+                  <a:solidFill>
+                    <a:srgbClr val="000000">
+                      <a:alpha val="100000"/>
+                    </a:srgbClr>
+                  </a:solidFill>
+                  <a:latin typeface="Arial"/>
+                  <a:cs typeface="Arial"/>
+                </a:rPr>
+                <a:t>0</a:t>
+              </a:r>
+            </a:p>
+          </p:txBody>
+        </p:sp>
+        <p:sp>
+          <p:nvSpPr>
+            <p:cNvPr id="112" name="tx112"/>
+            <p:cNvSpPr/>
+            <p:nvPr/>
+          </p:nvSpPr>
+          <p:spPr>
+            <a:xfrm>
+              <a:off x="2645990" y="5411335"/>
+              <a:ext cx="169515" cy="111323"/>
+            </a:xfrm>
+            <a:prstGeom prst="rect">
+              <a:avLst/>
+            </a:prstGeom>
+            <a:noFill/>
+          </p:spPr>
+          <p:txBody>
+            <a:bodyPr lIns="0" rIns="0" tIns="0" bIns="0" anchorCtr="1" anchor="ctr" wrap="none"/>
+            <a:lstStyle/>
+            <a:p>
+              <a:pPr algn="l" marL="0" marR="0" indent="0">
+                <a:lnSpc>
+                  <a:spcPts val="1200"/>
+                </a:lnSpc>
+                <a:spcBef>
+                  <a:spcPts val="0"/>
+                </a:spcBef>
+                <a:spcAft>
+                  <a:spcPts val="0"/>
+                </a:spcAft>
+              </a:pPr>
+              <a:r>
+                <a:rPr sz="1200">
+                  <a:solidFill>
+                    <a:srgbClr val="000000">
+                      <a:alpha val="100000"/>
+                    </a:srgbClr>
+                  </a:solidFill>
+                  <a:latin typeface="Arial"/>
+                  <a:cs typeface="Arial"/>
+                </a:rPr>
+                <a:t>20</a:t>
+              </a:r>
+            </a:p>
+          </p:txBody>
+        </p:sp>
+        <p:sp>
+          <p:nvSpPr>
+            <p:cNvPr id="113" name="tx113"/>
+            <p:cNvSpPr/>
+            <p:nvPr/>
+          </p:nvSpPr>
+          <p:spPr>
+            <a:xfrm>
+              <a:off x="3973290" y="5411335"/>
+              <a:ext cx="169515" cy="111323"/>
+            </a:xfrm>
+            <a:prstGeom prst="rect">
+              <a:avLst/>
+            </a:prstGeom>
+            <a:noFill/>
+          </p:spPr>
+          <p:txBody>
+            <a:bodyPr lIns="0" rIns="0" tIns="0" bIns="0" anchorCtr="1" anchor="ctr" wrap="none"/>
+            <a:lstStyle/>
+            <a:p>
+              <a:pPr algn="l" marL="0" marR="0" indent="0">
+                <a:lnSpc>
+                  <a:spcPts val="1200"/>
+                </a:lnSpc>
+                <a:spcBef>
+                  <a:spcPts val="0"/>
+                </a:spcBef>
+                <a:spcAft>
+                  <a:spcPts val="0"/>
+                </a:spcAft>
+              </a:pPr>
+              <a:r>
+                <a:rPr sz="1200">
+                  <a:solidFill>
+                    <a:srgbClr val="000000">
+                      <a:alpha val="100000"/>
+                    </a:srgbClr>
+                  </a:solidFill>
+                  <a:latin typeface="Arial"/>
+                  <a:cs typeface="Arial"/>
+                </a:rPr>
+                <a:t>40</a:t>
+              </a:r>
+            </a:p>
+          </p:txBody>
+        </p:sp>
+        <p:sp>
+          <p:nvSpPr>
+            <p:cNvPr id="114" name="tx114"/>
+            <p:cNvSpPr/>
+            <p:nvPr/>
+          </p:nvSpPr>
+          <p:spPr>
+            <a:xfrm>
+              <a:off x="5300589" y="5411335"/>
+              <a:ext cx="169515" cy="111323"/>
+            </a:xfrm>
+            <a:prstGeom prst="rect">
+              <a:avLst/>
+            </a:prstGeom>
+            <a:noFill/>
+          </p:spPr>
+          <p:txBody>
+            <a:bodyPr lIns="0" rIns="0" tIns="0" bIns="0" anchorCtr="1" anchor="ctr" wrap="none"/>
+            <a:lstStyle/>
+            <a:p>
+              <a:pPr algn="l" marL="0" marR="0" indent="0">
+                <a:lnSpc>
+                  <a:spcPts val="1200"/>
+                </a:lnSpc>
+                <a:spcBef>
+                  <a:spcPts val="0"/>
+                </a:spcBef>
+                <a:spcAft>
+                  <a:spcPts val="0"/>
+                </a:spcAft>
+              </a:pPr>
+              <a:r>
+                <a:rPr sz="1200">
+                  <a:solidFill>
+                    <a:srgbClr val="000000">
+                      <a:alpha val="100000"/>
+                    </a:srgbClr>
+                  </a:solidFill>
+                  <a:latin typeface="Arial"/>
+                  <a:cs typeface="Arial"/>
+                </a:rPr>
+                <a:t>60</a:t>
+              </a:r>
+            </a:p>
+          </p:txBody>
+        </p:sp>
+        <p:sp>
+          <p:nvSpPr>
+            <p:cNvPr id="115" name="tx115"/>
+            <p:cNvSpPr/>
+            <p:nvPr/>
+          </p:nvSpPr>
+          <p:spPr>
+            <a:xfrm>
+              <a:off x="6627889" y="5411335"/>
+              <a:ext cx="169515" cy="111323"/>
+            </a:xfrm>
+            <a:prstGeom prst="rect">
+              <a:avLst/>
+            </a:prstGeom>
+            <a:noFill/>
+          </p:spPr>
+          <p:txBody>
+            <a:bodyPr lIns="0" rIns="0" tIns="0" bIns="0" anchorCtr="1" anchor="ctr" wrap="none"/>
+            <a:lstStyle/>
+            <a:p>
+              <a:pPr algn="l" marL="0" marR="0" indent="0">
+                <a:lnSpc>
+                  <a:spcPts val="1200"/>
+                </a:lnSpc>
+                <a:spcBef>
+                  <a:spcPts val="0"/>
+                </a:spcBef>
+                <a:spcAft>
+                  <a:spcPts val="0"/>
+                </a:spcAft>
+              </a:pPr>
+              <a:r>
+                <a:rPr sz="1200">
+                  <a:solidFill>
+                    <a:srgbClr val="000000">
+                      <a:alpha val="100000"/>
+                    </a:srgbClr>
+                  </a:solidFill>
+                  <a:latin typeface="Arial"/>
+                  <a:cs typeface="Arial"/>
+                </a:rPr>
+                <a:t>80</a:t>
+              </a:r>
+            </a:p>
+          </p:txBody>
+        </p:sp>
+        <p:sp>
+          <p:nvSpPr>
+            <p:cNvPr id="116" name="tx116"/>
+            <p:cNvSpPr/>
+            <p:nvPr/>
+          </p:nvSpPr>
+          <p:spPr>
+            <a:xfrm>
+              <a:off x="7912810" y="5411335"/>
+              <a:ext cx="254272" cy="111323"/>
+            </a:xfrm>
+            <a:prstGeom prst="rect">
+              <a:avLst/>
+            </a:prstGeom>
+            <a:noFill/>
+          </p:spPr>
+          <p:txBody>
+            <a:bodyPr lIns="0" rIns="0" tIns="0" bIns="0" anchorCtr="1" anchor="ctr" wrap="none"/>
+            <a:lstStyle/>
+            <a:p>
+              <a:pPr algn="l" marL="0" marR="0" indent="0">
+                <a:lnSpc>
+                  <a:spcPts val="1200"/>
+                </a:lnSpc>
+                <a:spcBef>
+                  <a:spcPts val="0"/>
+                </a:spcBef>
+                <a:spcAft>
+                  <a:spcPts val="0"/>
+                </a:spcAft>
+              </a:pPr>
+              <a:r>
+                <a:rPr sz="1200">
+                  <a:solidFill>
+                    <a:srgbClr val="000000">
+                      <a:alpha val="100000"/>
+                    </a:srgbClr>
+                  </a:solidFill>
+                  <a:latin typeface="Arial"/>
+                  <a:cs typeface="Arial"/>
+                </a:rPr>
+                <a:t>100</a:t>
+              </a:r>
+            </a:p>
+          </p:txBody>
+        </p:sp>
+        <p:sp>
+          <p:nvSpPr>
+            <p:cNvPr id="117" name="pl117"/>
+            <p:cNvSpPr/>
+            <p:nvPr/>
+          </p:nvSpPr>
+          <p:spPr>
+            <a:xfrm>
+              <a:off x="1207008" y="2433412"/>
+              <a:ext cx="0" cy="2759920"/>
+            </a:xfrm>
+            <a:custGeom>
+              <a:avLst/>
+              <a:pathLst>
+                <a:path w="0" h="2759920">
+                  <a:moveTo>
+                    <a:pt x="0" y="2759920"/>
+                  </a:moveTo>
+                  <a:lnTo>
+                    <a:pt x="0" y="0"/>
+                  </a:lnTo>
+                </a:path>
+              </a:pathLst>
+            </a:custGeom>
+            <a:ln w="9525" cap="rnd">
+              <a:solidFill>
+                <a:srgbClr val="000000">
+                  <a:alpha val="100000"/>
+                </a:srgbClr>
+              </a:solidFill>
+              <a:prstDash val="solid"/>
+              <a:round/>
+            </a:ln>
+          </p:spPr>
+          <p:txBody>
+            <a:bodyPr/>
+            <a:lstStyle/>
+            <a:p/>
+          </p:txBody>
+        </p:sp>
+        <p:sp>
+          <p:nvSpPr>
+            <p:cNvPr id="118" name="pl118"/>
+            <p:cNvSpPr/>
+            <p:nvPr/>
+          </p:nvSpPr>
+          <p:spPr>
+            <a:xfrm>
+              <a:off x="1115567" y="5193333"/>
+              <a:ext cx="91440" cy="0"/>
+            </a:xfrm>
+            <a:custGeom>
+              <a:avLst/>
+              <a:pathLst>
+                <a:path w="91440" h="0">
+                  <a:moveTo>
+                    <a:pt x="91440" y="0"/>
+                  </a:moveTo>
+                  <a:lnTo>
+                    <a:pt x="0" y="0"/>
+                  </a:lnTo>
+                </a:path>
+              </a:pathLst>
+            </a:custGeom>
+            <a:ln w="9525" cap="rnd">
+              <a:solidFill>
+                <a:srgbClr val="000000">
+                  <a:alpha val="100000"/>
+                </a:srgbClr>
+              </a:solidFill>
+              <a:prstDash val="solid"/>
+              <a:round/>
+            </a:ln>
+          </p:spPr>
+          <p:txBody>
+            <a:bodyPr/>
+            <a:lstStyle/>
+            <a:p/>
+          </p:txBody>
+        </p:sp>
+        <p:sp>
+          <p:nvSpPr>
+            <p:cNvPr id="119" name="pl119"/>
+            <p:cNvSpPr/>
+            <p:nvPr/>
+          </p:nvSpPr>
+          <p:spPr>
+            <a:xfrm>
+              <a:off x="1115567" y="4641348"/>
+              <a:ext cx="91440" cy="0"/>
+            </a:xfrm>
+            <a:custGeom>
+              <a:avLst/>
+              <a:pathLst>
+                <a:path w="91440" h="0">
+                  <a:moveTo>
+                    <a:pt x="91440" y="0"/>
+                  </a:moveTo>
+                  <a:lnTo>
+                    <a:pt x="0" y="0"/>
+                  </a:lnTo>
+                </a:path>
+              </a:pathLst>
+            </a:custGeom>
+            <a:ln w="9525" cap="rnd">
+              <a:solidFill>
+                <a:srgbClr val="000000">
+                  <a:alpha val="100000"/>
+                </a:srgbClr>
+              </a:solidFill>
+              <a:prstDash val="solid"/>
+              <a:round/>
+            </a:ln>
+          </p:spPr>
+          <p:txBody>
+            <a:bodyPr/>
+            <a:lstStyle/>
+            <a:p/>
+          </p:txBody>
+        </p:sp>
+        <p:sp>
+          <p:nvSpPr>
+            <p:cNvPr id="120" name="pl120"/>
+            <p:cNvSpPr/>
+            <p:nvPr/>
+          </p:nvSpPr>
+          <p:spPr>
+            <a:xfrm>
+              <a:off x="1115567" y="4089364"/>
+              <a:ext cx="91440" cy="0"/>
+            </a:xfrm>
+            <a:custGeom>
+              <a:avLst/>
+              <a:pathLst>
+                <a:path w="91440" h="0">
+                  <a:moveTo>
+                    <a:pt x="91440" y="0"/>
+                  </a:moveTo>
+                  <a:lnTo>
+                    <a:pt x="0" y="0"/>
+                  </a:lnTo>
+                </a:path>
+              </a:pathLst>
+            </a:custGeom>
+            <a:ln w="9525" cap="rnd">
+              <a:solidFill>
+                <a:srgbClr val="000000">
+                  <a:alpha val="100000"/>
+                </a:srgbClr>
+              </a:solidFill>
+              <a:prstDash val="solid"/>
+              <a:round/>
+            </a:ln>
+          </p:spPr>
+          <p:txBody>
+            <a:bodyPr/>
+            <a:lstStyle/>
+            <a:p/>
+          </p:txBody>
+        </p:sp>
+        <p:sp>
+          <p:nvSpPr>
+            <p:cNvPr id="121" name="pl121"/>
+            <p:cNvSpPr/>
+            <p:nvPr/>
+          </p:nvSpPr>
+          <p:spPr>
+            <a:xfrm>
+              <a:off x="1115567" y="3537380"/>
+              <a:ext cx="91440" cy="0"/>
+            </a:xfrm>
+            <a:custGeom>
+              <a:avLst/>
+              <a:pathLst>
+                <a:path w="91440" h="0">
+                  <a:moveTo>
+                    <a:pt x="91440" y="0"/>
+                  </a:moveTo>
+                  <a:lnTo>
+                    <a:pt x="0" y="0"/>
+                  </a:lnTo>
+                </a:path>
+              </a:pathLst>
+            </a:custGeom>
+            <a:ln w="9525" cap="rnd">
+              <a:solidFill>
+                <a:srgbClr val="000000">
+                  <a:alpha val="100000"/>
+                </a:srgbClr>
+              </a:solidFill>
+              <a:prstDash val="solid"/>
+              <a:round/>
+            </a:ln>
+          </p:spPr>
+          <p:txBody>
+            <a:bodyPr/>
+            <a:lstStyle/>
+            <a:p/>
+          </p:txBody>
+        </p:sp>
+        <p:sp>
+          <p:nvSpPr>
+            <p:cNvPr id="122" name="pl122"/>
+            <p:cNvSpPr/>
+            <p:nvPr/>
+          </p:nvSpPr>
+          <p:spPr>
+            <a:xfrm>
+              <a:off x="1115567" y="2985396"/>
+              <a:ext cx="91440" cy="0"/>
+            </a:xfrm>
+            <a:custGeom>
+              <a:avLst/>
+              <a:pathLst>
+                <a:path w="91440" h="0">
+                  <a:moveTo>
+                    <a:pt x="91440" y="0"/>
+                  </a:moveTo>
+                  <a:lnTo>
+                    <a:pt x="0" y="0"/>
+                  </a:lnTo>
+                </a:path>
+              </a:pathLst>
+            </a:custGeom>
+            <a:ln w="9525" cap="rnd">
+              <a:solidFill>
+                <a:srgbClr val="000000">
+                  <a:alpha val="100000"/>
+                </a:srgbClr>
+              </a:solidFill>
+              <a:prstDash val="solid"/>
+              <a:round/>
+            </a:ln>
+          </p:spPr>
+          <p:txBody>
+            <a:bodyPr/>
+            <a:lstStyle/>
+            <a:p/>
+          </p:txBody>
+        </p:sp>
+        <p:sp>
+          <p:nvSpPr>
+            <p:cNvPr id="123" name="pl123"/>
+            <p:cNvSpPr/>
+            <p:nvPr/>
+          </p:nvSpPr>
+          <p:spPr>
+            <a:xfrm>
+              <a:off x="1115567" y="2433412"/>
+              <a:ext cx="91440" cy="0"/>
+            </a:xfrm>
+            <a:custGeom>
+              <a:avLst/>
+              <a:pathLst>
+                <a:path w="91440" h="0">
+                  <a:moveTo>
+                    <a:pt x="91440" y="0"/>
+                  </a:moveTo>
+                  <a:lnTo>
+                    <a:pt x="0" y="0"/>
+                  </a:lnTo>
+                </a:path>
+              </a:pathLst>
+            </a:custGeom>
+            <a:ln w="9525" cap="rnd">
+              <a:solidFill>
+                <a:srgbClr val="000000">
+                  <a:alpha val="100000"/>
+                </a:srgbClr>
+              </a:solidFill>
+              <a:prstDash val="solid"/>
+              <a:round/>
+            </a:ln>
+          </p:spPr>
+          <p:txBody>
+            <a:bodyPr/>
+            <a:lstStyle/>
+            <a:p/>
+          </p:txBody>
+        </p:sp>
+        <p:sp>
+          <p:nvSpPr>
+            <p:cNvPr id="124" name="tx124"/>
+            <p:cNvSpPr/>
+            <p:nvPr/>
+          </p:nvSpPr>
+          <p:spPr>
+            <a:xfrm rot="-5400000">
+              <a:off x="864037" y="5137572"/>
+              <a:ext cx="135508" cy="111521"/>
+            </a:xfrm>
+            <a:prstGeom prst="rect">
+              <a:avLst/>
+            </a:prstGeom>
+            <a:noFill/>
+          </p:spPr>
+          <p:txBody>
+            <a:bodyPr lIns="0" rIns="0" tIns="0" bIns="0" anchorCtr="1" anchor="ctr" wrap="none"/>
+            <a:lstStyle/>
+            <a:p>
+              <a:pPr algn="l" marL="0" marR="0" indent="0">
+                <a:lnSpc>
+                  <a:spcPts val="1200"/>
+                </a:lnSpc>
+                <a:spcBef>
+                  <a:spcPts val="0"/>
+                </a:spcBef>
+                <a:spcAft>
+                  <a:spcPts val="0"/>
+                </a:spcAft>
+              </a:pPr>
+              <a:r>
+                <a:rPr sz="1200">
+                  <a:solidFill>
+                    <a:srgbClr val="000000">
+                      <a:alpha val="100000"/>
+                    </a:srgbClr>
+                  </a:solidFill>
+                  <a:latin typeface="Arial"/>
+                  <a:cs typeface="Arial"/>
+                </a:rPr>
+                <a:t>-3</a:t>
+              </a:r>
+            </a:p>
+          </p:txBody>
+        </p:sp>
+        <p:sp>
+          <p:nvSpPr>
+            <p:cNvPr id="125" name="tx125"/>
+            <p:cNvSpPr/>
+            <p:nvPr/>
+          </p:nvSpPr>
+          <p:spPr>
+            <a:xfrm rot="-5400000">
+              <a:off x="865029" y="4586580"/>
+              <a:ext cx="135508" cy="109537"/>
+            </a:xfrm>
+            <a:prstGeom prst="rect">
+              <a:avLst/>
+            </a:prstGeom>
+            <a:noFill/>
+          </p:spPr>
+          <p:txBody>
+            <a:bodyPr lIns="0" rIns="0" tIns="0" bIns="0" anchorCtr="1" anchor="ctr" wrap="none"/>
+            <a:lstStyle/>
+            <a:p>
+              <a:pPr algn="l" marL="0" marR="0" indent="0">
+                <a:lnSpc>
+                  <a:spcPts val="1200"/>
+                </a:lnSpc>
+                <a:spcBef>
+                  <a:spcPts val="0"/>
+                </a:spcBef>
+                <a:spcAft>
+                  <a:spcPts val="0"/>
+                </a:spcAft>
+              </a:pPr>
+              <a:r>
+                <a:rPr sz="1200">
+                  <a:solidFill>
+                    <a:srgbClr val="000000">
+                      <a:alpha val="100000"/>
+                    </a:srgbClr>
+                  </a:solidFill>
+                  <a:latin typeface="Arial"/>
+                  <a:cs typeface="Arial"/>
+                </a:rPr>
+                <a:t>-2</a:t>
+              </a:r>
+            </a:p>
+          </p:txBody>
+        </p:sp>
+        <p:sp>
+          <p:nvSpPr>
+            <p:cNvPr id="126" name="tx126"/>
+            <p:cNvSpPr/>
+            <p:nvPr/>
+          </p:nvSpPr>
+          <p:spPr>
+            <a:xfrm rot="-5400000">
+              <a:off x="865029" y="4034596"/>
+              <a:ext cx="135508" cy="109537"/>
+            </a:xfrm>
+            <a:prstGeom prst="rect">
+              <a:avLst/>
+            </a:prstGeom>
+            <a:noFill/>
+          </p:spPr>
+          <p:txBody>
+            <a:bodyPr lIns="0" rIns="0" tIns="0" bIns="0" anchorCtr="1" anchor="ctr" wrap="none"/>
+            <a:lstStyle/>
+            <a:p>
+              <a:pPr algn="l" marL="0" marR="0" indent="0">
+                <a:lnSpc>
+                  <a:spcPts val="1200"/>
+                </a:lnSpc>
+                <a:spcBef>
+                  <a:spcPts val="0"/>
+                </a:spcBef>
+                <a:spcAft>
+                  <a:spcPts val="0"/>
+                </a:spcAft>
+              </a:pPr>
+              <a:r>
+                <a:rPr sz="1200">
+                  <a:solidFill>
+                    <a:srgbClr val="000000">
+                      <a:alpha val="100000"/>
+                    </a:srgbClr>
+                  </a:solidFill>
+                  <a:latin typeface="Arial"/>
+                  <a:cs typeface="Arial"/>
+                </a:rPr>
+                <a:t>-1</a:t>
+              </a:r>
+            </a:p>
+          </p:txBody>
+        </p:sp>
+        <p:sp>
+          <p:nvSpPr>
+            <p:cNvPr id="127" name="tx127"/>
+            <p:cNvSpPr/>
+            <p:nvPr/>
+          </p:nvSpPr>
+          <p:spPr>
+            <a:xfrm rot="-5400000">
+              <a:off x="889511" y="3481719"/>
+              <a:ext cx="84757" cy="111323"/>
+            </a:xfrm>
+            <a:prstGeom prst="rect">
+              <a:avLst/>
+            </a:prstGeom>
+            <a:noFill/>
+          </p:spPr>
+          <p:txBody>
+            <a:bodyPr lIns="0" rIns="0" tIns="0" bIns="0" anchorCtr="1" anchor="ctr" wrap="none"/>
+            <a:lstStyle/>
+            <a:p>
+              <a:pPr algn="l" marL="0" marR="0" indent="0">
+                <a:lnSpc>
+                  <a:spcPts val="1200"/>
+                </a:lnSpc>
+                <a:spcBef>
+                  <a:spcPts val="0"/>
+                </a:spcBef>
+                <a:spcAft>
+                  <a:spcPts val="0"/>
+                </a:spcAft>
+              </a:pPr>
+              <a:r>
+                <a:rPr sz="1200">
+                  <a:solidFill>
+                    <a:srgbClr val="000000">
+                      <a:alpha val="100000"/>
+                    </a:srgbClr>
+                  </a:solidFill>
+                  <a:latin typeface="Arial"/>
+                  <a:cs typeface="Arial"/>
+                </a:rPr>
+                <a:t>0</a:t>
+              </a:r>
+            </a:p>
+          </p:txBody>
+        </p:sp>
+        <p:sp>
+          <p:nvSpPr>
+            <p:cNvPr id="128" name="tx128"/>
+            <p:cNvSpPr/>
+            <p:nvPr/>
+          </p:nvSpPr>
+          <p:spPr>
+            <a:xfrm rot="-5400000">
+              <a:off x="890404" y="2930627"/>
+              <a:ext cx="84757" cy="109537"/>
+            </a:xfrm>
+            <a:prstGeom prst="rect">
+              <a:avLst/>
+            </a:prstGeom>
+            <a:noFill/>
+          </p:spPr>
+          <p:txBody>
+            <a:bodyPr lIns="0" rIns="0" tIns="0" bIns="0" anchorCtr="1" anchor="ctr" wrap="none"/>
+            <a:lstStyle/>
+            <a:p>
+              <a:pPr algn="l" marL="0" marR="0" indent="0">
+                <a:lnSpc>
+                  <a:spcPts val="1200"/>
+                </a:lnSpc>
+                <a:spcBef>
+                  <a:spcPts val="0"/>
+                </a:spcBef>
+                <a:spcAft>
+                  <a:spcPts val="0"/>
+                </a:spcAft>
+              </a:pPr>
+              <a:r>
+                <a:rPr sz="1200">
+                  <a:solidFill>
+                    <a:srgbClr val="000000">
+                      <a:alpha val="100000"/>
+                    </a:srgbClr>
+                  </a:solidFill>
+                  <a:latin typeface="Arial"/>
+                  <a:cs typeface="Arial"/>
+                </a:rPr>
+                <a:t>1</a:t>
+              </a:r>
+            </a:p>
+          </p:txBody>
+        </p:sp>
+        <p:sp>
+          <p:nvSpPr>
+            <p:cNvPr id="129" name="tx129"/>
+            <p:cNvSpPr/>
+            <p:nvPr/>
+          </p:nvSpPr>
+          <p:spPr>
+            <a:xfrm rot="-5400000">
+              <a:off x="890404" y="2378643"/>
+              <a:ext cx="84757" cy="109537"/>
+            </a:xfrm>
+            <a:prstGeom prst="rect">
+              <a:avLst/>
+            </a:prstGeom>
+            <a:noFill/>
+          </p:spPr>
+          <p:txBody>
+            <a:bodyPr lIns="0" rIns="0" tIns="0" bIns="0" anchorCtr="1" anchor="ctr" wrap="none"/>
+            <a:lstStyle/>
+            <a:p>
+              <a:pPr algn="l" marL="0" marR="0" indent="0">
+                <a:lnSpc>
+                  <a:spcPts val="1200"/>
+                </a:lnSpc>
+                <a:spcBef>
+                  <a:spcPts val="0"/>
+                </a:spcBef>
+                <a:spcAft>
+                  <a:spcPts val="0"/>
+                </a:spcAft>
+              </a:pPr>
+              <a:r>
+                <a:rPr sz="1200">
+                  <a:solidFill>
+                    <a:srgbClr val="000000">
+                      <a:alpha val="100000"/>
+                    </a:srgbClr>
+                  </a:solidFill>
+                  <a:latin typeface="Arial"/>
+                  <a:cs typeface="Arial"/>
+                </a:rPr>
+                <a:t>2</a:t>
+              </a:r>
+            </a:p>
+          </p:txBody>
+        </p:sp>
+        <p:sp>
+          <p:nvSpPr>
+            <p:cNvPr id="130" name="pl130"/>
+            <p:cNvSpPr/>
+            <p:nvPr/>
+          </p:nvSpPr>
+          <p:spPr>
+            <a:xfrm>
+              <a:off x="1207008" y="2350008"/>
+              <a:ext cx="7095744" cy="2843466"/>
+            </a:xfrm>
+            <a:custGeom>
+              <a:avLst/>
+              <a:pathLst>
+                <a:path w="7095744" h="2843466">
+                  <a:moveTo>
+                    <a:pt x="0" y="2843466"/>
+                  </a:moveTo>
+                  <a:lnTo>
+                    <a:pt x="7095744" y="2843466"/>
+                  </a:lnTo>
+                  <a:lnTo>
+                    <a:pt x="7095744" y="0"/>
+                  </a:lnTo>
+                  <a:lnTo>
+                    <a:pt x="0" y="0"/>
+                  </a:lnTo>
+                  <a:lnTo>
+                    <a:pt x="0" y="2843466"/>
+                  </a:lnTo>
+                </a:path>
+              </a:pathLst>
+            </a:custGeom>
+            <a:ln w="9525" cap="rnd">
+              <a:solidFill>
+                <a:srgbClr val="000000">
+                  <a:alpha val="100000"/>
+                </a:srgbClr>
+              </a:solidFill>
+              <a:prstDash val="solid"/>
+              <a:round/>
+            </a:ln>
+          </p:spPr>
+          <p:txBody>
+            <a:bodyPr/>
+            <a:lstStyle/>
+            <a:p/>
+          </p:txBody>
+        </p:sp>
+        <p:sp>
+          <p:nvSpPr>
+            <p:cNvPr id="131" name="tx131"/>
+            <p:cNvSpPr/>
+            <p:nvPr/>
+          </p:nvSpPr>
+          <p:spPr>
+            <a:xfrm>
+              <a:off x="4568472" y="5777492"/>
+              <a:ext cx="372814" cy="110926"/>
+            </a:xfrm>
+            <a:prstGeom prst="rect">
+              <a:avLst/>
+            </a:prstGeom>
+            <a:noFill/>
+          </p:spPr>
+          <p:txBody>
+            <a:bodyPr lIns="0" rIns="0" tIns="0" bIns="0" anchorCtr="1" anchor="ctr" wrap="none"/>
+            <a:lstStyle/>
+            <a:p>
+              <a:pPr algn="l" marL="0" marR="0" indent="0">
+                <a:lnSpc>
+                  <a:spcPts val="1200"/>
+                </a:lnSpc>
+                <a:spcBef>
+                  <a:spcPts val="0"/>
+                </a:spcBef>
+                <a:spcAft>
+                  <a:spcPts val="0"/>
+                </a:spcAft>
+              </a:pPr>
+              <a:r>
+                <a:rPr sz="1200">
+                  <a:solidFill>
+                    <a:srgbClr val="000000">
+                      <a:alpha val="100000"/>
+                    </a:srgbClr>
+                  </a:solidFill>
+                  <a:latin typeface="Arial"/>
+                  <a:cs typeface="Arial"/>
+                </a:rPr>
+                <a:t>Index</a:t>
+              </a:r>
+            </a:p>
+          </p:txBody>
+        </p:sp>
+        <p:sp>
+          <p:nvSpPr>
+            <p:cNvPr id="132" name="tx132"/>
+            <p:cNvSpPr/>
+            <p:nvPr/>
+          </p:nvSpPr>
+          <p:spPr>
+            <a:xfrm rot="-5400000">
+              <a:off x="173385" y="3700204"/>
+              <a:ext cx="753740" cy="143073"/>
+            </a:xfrm>
+            <a:prstGeom prst="rect">
+              <a:avLst/>
+            </a:prstGeom>
+            <a:noFill/>
+          </p:spPr>
+          <p:txBody>
+            <a:bodyPr lIns="0" rIns="0" tIns="0" bIns="0" anchorCtr="1" anchor="ctr" wrap="none"/>
+            <a:lstStyle/>
+            <a:p>
+              <a:pPr algn="l" marL="0" marR="0" indent="0">
+                <a:lnSpc>
+                  <a:spcPts val="1200"/>
+                </a:lnSpc>
+                <a:spcBef>
+                  <a:spcPts val="0"/>
+                </a:spcBef>
+                <a:spcAft>
+                  <a:spcPts val="0"/>
+                </a:spcAft>
+              </a:pPr>
+              <a:r>
+                <a:rPr sz="1200">
+                  <a:solidFill>
+                    <a:srgbClr val="000000">
+                      <a:alpha val="100000"/>
+                    </a:srgbClr>
+                  </a:solidFill>
+                  <a:latin typeface="Arial"/>
+                  <a:cs typeface="Arial"/>
+                </a:rPr>
+                <a:t>rnorm(100)</a:t>
+              </a:r>
+            </a:p>
+          </p:txBody>
+        </p:sp>
+      </p:grpSp>
+    </p:spTree>
+  </p:cSld>
+  <p:clrMapOvr>
+    <a:masterClrMapping/>
+  </p:clrMapOvr>
+</p:sld>
+</file>
+
+<file path=ppt/slides/slide4.xml><?xml version="1.0" encoding="utf-8"?>
+<p:sld xmlns:a="http://schemas.openxmlformats.org/drawingml/2006/main" xmlns:r="http://schemas.openxmlformats.org/officeDocument/2006/relationships" xmlns:p="http://schemas.openxmlformats.org/presentationml/2006/main">
+  <p:cSld>
+    <p:spTree>
+      <p:nvGrpSpPr>
+        <p:cNvPr id="1" name=""/>
+        <p:cNvGrpSpPr/>
+        <p:nvPr/>
+      </p:nvGrpSpPr>
+      <p:grpSpPr>
+        <a:xfrm>
+          <a:off x="0" y="0"/>
+          <a:ext cx="0" cy="0"/>
+          <a:chOff x="0" y="0"/>
+          <a:chExt cx="0" cy="0"/>
+        </a:xfrm>
+      </p:grpSpPr>
       <p:sp xmlns:a="http://schemas.openxmlformats.org/drawingml/2006/main" xmlns:r="http://schemas.openxmlformats.org/officeDocument/2006/relationships" xmlns:p="http://schemas.openxmlformats.org/presentationml/2006/main">
         <p:nvSpPr>
           <p:cNvPr id="2" name=""/>
@@ -2981,7 +7310,7 @@
       </p:sp>
       <p:graphicFrame xmlns:a="http://schemas.openxmlformats.org/drawingml/2006/main" xmlns:r="http://schemas.openxmlformats.org/officeDocument/2006/relationships" xmlns:p="http://schemas.openxmlformats.org/presentationml/2006/main">
         <p:nvGraphicFramePr>
-          <p:cNvPr id="3" name=""/>
+          <p:cNvPr name="" id="3"/>
           <p:cNvGraphicFramePr>
             <a:graphicFrameLocks noGrp="true"/>
           </p:cNvGraphicFramePr>

</xml_diff>